<commit_message>
update shape opt overview
</commit_message>
<xml_diff>
--- a/docs/pages/Applications/Shape_Optimization_Application/Siemens_NX/Guided_beam_example/images/fixed_beam.pptx
+++ b/docs/pages/Applications/Shape_Optimization_Application/Siemens_NX/Guided_beam_example/images/fixed_beam.pptx
@@ -15,6 +15,17 @@
     <p:sldId id="263" r:id="rId9"/>
     <p:sldId id="264" r:id="rId10"/>
     <p:sldId id="265" r:id="rId11"/>
+    <p:sldId id="266" r:id="rId12"/>
+    <p:sldId id="267" r:id="rId13"/>
+    <p:sldId id="268" r:id="rId14"/>
+    <p:sldId id="269" r:id="rId15"/>
+    <p:sldId id="270" r:id="rId16"/>
+    <p:sldId id="271" r:id="rId17"/>
+    <p:sldId id="272" r:id="rId18"/>
+    <p:sldId id="273" r:id="rId19"/>
+    <p:sldId id="274" r:id="rId20"/>
+    <p:sldId id="275" r:id="rId21"/>
+    <p:sldId id="276" r:id="rId22"/>
   </p:sldIdLst>
   <p:sldSz cx="12192000" cy="6858000"/>
   <p:notesSz cx="6858000" cy="9144000"/>
@@ -3822,7 +3833,7 @@
         </p:nvCxnSpPr>
         <p:spPr>
           <a:xfrm>
-            <a:off x="4813069" y="1479665"/>
+            <a:off x="4817193" y="1479665"/>
             <a:ext cx="340822" cy="0"/>
           </a:xfrm>
           <a:prstGeom prst="straightConnector1">
@@ -4018,9 +4029,1768 @@
           <a:p>
             <a:pPr algn="ctr"/>
             <a:r>
-              <a:rPr lang="en-US"/>
-              <a:t>2</a:t>
+              <a:rPr lang="en-US" dirty="0"/>
+              <a:t>21</a:t>
             </a:r>
+          </a:p>
+        </p:txBody>
+      </p:sp>
+    </p:spTree>
+    <p:extLst>
+      <p:ext uri="{BB962C8B-B14F-4D97-AF65-F5344CB8AC3E}">
+        <p14:creationId xmlns:p14="http://schemas.microsoft.com/office/powerpoint/2010/main" val="2066687573"/>
+      </p:ext>
+    </p:extLst>
+  </p:cSld>
+  <p:clrMapOvr>
+    <a:masterClrMapping/>
+  </p:clrMapOvr>
+</p:sld>
+</file>
+
+<file path=ppt/slides/slide11.xml><?xml version="1.0" encoding="utf-8"?>
+<p:sld xmlns:a="http://schemas.openxmlformats.org/drawingml/2006/main" xmlns:r="http://schemas.openxmlformats.org/officeDocument/2006/relationships" xmlns:p="http://schemas.openxmlformats.org/presentationml/2006/main">
+  <p:cSld>
+    <p:spTree>
+      <p:nvGrpSpPr>
+        <p:cNvPr id="1" name=""/>
+        <p:cNvGrpSpPr/>
+        <p:nvPr/>
+      </p:nvGrpSpPr>
+      <p:grpSpPr>
+        <a:xfrm>
+          <a:off x="0" y="0"/>
+          <a:ext cx="0" cy="0"/>
+          <a:chOff x="0" y="0"/>
+          <a:chExt cx="0" cy="0"/>
+        </a:xfrm>
+      </p:grpSpPr>
+      <p:pic>
+        <p:nvPicPr>
+          <p:cNvPr id="3" name="Picture 2">
+            <a:extLst>
+              <a:ext uri="{FF2B5EF4-FFF2-40B4-BE49-F238E27FC236}">
+                <a16:creationId xmlns:a16="http://schemas.microsoft.com/office/drawing/2014/main" id="{F91CFBAD-28E5-46ED-9077-06BDAD20258F}"/>
+              </a:ext>
+            </a:extLst>
+          </p:cNvPr>
+          <p:cNvPicPr>
+            <a:picLocks noChangeAspect="1"/>
+          </p:cNvPicPr>
+          <p:nvPr/>
+        </p:nvPicPr>
+        <p:blipFill>
+          <a:blip r:embed="rId2"/>
+          <a:stretch>
+            <a:fillRect/>
+          </a:stretch>
+        </p:blipFill>
+        <p:spPr>
+          <a:xfrm>
+            <a:off x="1826666" y="867883"/>
+            <a:ext cx="3309962" cy="4714909"/>
+          </a:xfrm>
+          <a:prstGeom prst="rect">
+            <a:avLst/>
+          </a:prstGeom>
+        </p:spPr>
+      </p:pic>
+      <p:sp>
+        <p:nvSpPr>
+          <p:cNvPr id="4" name="Oval 3">
+            <a:extLst>
+              <a:ext uri="{FF2B5EF4-FFF2-40B4-BE49-F238E27FC236}">
+                <a16:creationId xmlns:a16="http://schemas.microsoft.com/office/drawing/2014/main" id="{D6505357-24D9-4A16-B7DC-524BC4565A86}"/>
+              </a:ext>
+            </a:extLst>
+          </p:cNvPr>
+          <p:cNvSpPr/>
+          <p:nvPr/>
+        </p:nvSpPr>
+        <p:spPr>
+          <a:xfrm>
+            <a:off x="2165432" y="5282738"/>
+            <a:ext cx="631799" cy="137160"/>
+          </a:xfrm>
+          <a:prstGeom prst="ellipse">
+            <a:avLst/>
+          </a:prstGeom>
+          <a:noFill/>
+          <a:ln w="28575">
+            <a:solidFill>
+              <a:srgbClr val="FF0000"/>
+            </a:solidFill>
+          </a:ln>
+        </p:spPr>
+        <p:style>
+          <a:lnRef idx="2">
+            <a:schemeClr val="accent1">
+              <a:shade val="50000"/>
+            </a:schemeClr>
+          </a:lnRef>
+          <a:fillRef idx="1">
+            <a:schemeClr val="accent1"/>
+          </a:fillRef>
+          <a:effectRef idx="0">
+            <a:schemeClr val="accent1"/>
+          </a:effectRef>
+          <a:fontRef idx="minor">
+            <a:schemeClr val="lt1"/>
+          </a:fontRef>
+        </p:style>
+        <p:txBody>
+          <a:bodyPr rtlCol="0" anchor="ctr"/>
+          <a:lstStyle/>
+          <a:p>
+            <a:pPr algn="ctr"/>
+            <a:endParaRPr lang="en-US" dirty="0"/>
+          </a:p>
+        </p:txBody>
+      </p:sp>
+      <p:sp>
+        <p:nvSpPr>
+          <p:cNvPr id="5" name="TextBox 4">
+            <a:extLst>
+              <a:ext uri="{FF2B5EF4-FFF2-40B4-BE49-F238E27FC236}">
+                <a16:creationId xmlns:a16="http://schemas.microsoft.com/office/drawing/2014/main" id="{E1C661CB-E3AB-43BE-995B-E042F3ACE027}"/>
+              </a:ext>
+            </a:extLst>
+          </p:cNvPr>
+          <p:cNvSpPr txBox="1"/>
+          <p:nvPr/>
+        </p:nvSpPr>
+        <p:spPr>
+          <a:xfrm>
+            <a:off x="2389994" y="5166652"/>
+            <a:ext cx="1152533" cy="369332"/>
+          </a:xfrm>
+          <a:prstGeom prst="rect">
+            <a:avLst/>
+          </a:prstGeom>
+          <a:noFill/>
+        </p:spPr>
+        <p:txBody>
+          <a:bodyPr wrap="square" rtlCol="0">
+            <a:spAutoFit/>
+          </a:bodyPr>
+          <a:lstStyle/>
+          <a:p>
+            <a:pPr algn="ctr"/>
+            <a:r>
+              <a:rPr lang="en-US" dirty="0"/>
+              <a:t>22</a:t>
+            </a:r>
+          </a:p>
+        </p:txBody>
+      </p:sp>
+      <p:sp>
+        <p:nvSpPr>
+          <p:cNvPr id="6" name="Oval 5">
+            <a:extLst>
+              <a:ext uri="{FF2B5EF4-FFF2-40B4-BE49-F238E27FC236}">
+                <a16:creationId xmlns:a16="http://schemas.microsoft.com/office/drawing/2014/main" id="{E2E0AE1F-934B-48DB-A68A-810165DB264D}"/>
+              </a:ext>
+            </a:extLst>
+          </p:cNvPr>
+          <p:cNvSpPr/>
+          <p:nvPr/>
+        </p:nvSpPr>
+        <p:spPr>
+          <a:xfrm>
+            <a:off x="3865418" y="1112518"/>
+            <a:ext cx="465513" cy="375459"/>
+          </a:xfrm>
+          <a:prstGeom prst="ellipse">
+            <a:avLst/>
+          </a:prstGeom>
+          <a:noFill/>
+          <a:ln w="28575">
+            <a:solidFill>
+              <a:srgbClr val="FF0000"/>
+            </a:solidFill>
+          </a:ln>
+        </p:spPr>
+        <p:style>
+          <a:lnRef idx="2">
+            <a:schemeClr val="accent1">
+              <a:shade val="50000"/>
+            </a:schemeClr>
+          </a:lnRef>
+          <a:fillRef idx="1">
+            <a:schemeClr val="accent1"/>
+          </a:fillRef>
+          <a:effectRef idx="0">
+            <a:schemeClr val="accent1"/>
+          </a:effectRef>
+          <a:fontRef idx="minor">
+            <a:schemeClr val="lt1"/>
+          </a:fontRef>
+        </p:style>
+        <p:txBody>
+          <a:bodyPr rtlCol="0" anchor="ctr"/>
+          <a:lstStyle/>
+          <a:p>
+            <a:pPr algn="ctr"/>
+            <a:endParaRPr lang="en-US" dirty="0"/>
+          </a:p>
+        </p:txBody>
+      </p:sp>
+      <p:sp>
+        <p:nvSpPr>
+          <p:cNvPr id="7" name="TextBox 6">
+            <a:extLst>
+              <a:ext uri="{FF2B5EF4-FFF2-40B4-BE49-F238E27FC236}">
+                <a16:creationId xmlns:a16="http://schemas.microsoft.com/office/drawing/2014/main" id="{87970DCC-602C-4865-935E-AA731D4E7135}"/>
+              </a:ext>
+            </a:extLst>
+          </p:cNvPr>
+          <p:cNvSpPr txBox="1"/>
+          <p:nvPr/>
+        </p:nvSpPr>
+        <p:spPr>
+          <a:xfrm>
+            <a:off x="3754664" y="743186"/>
+            <a:ext cx="1152533" cy="369332"/>
+          </a:xfrm>
+          <a:prstGeom prst="rect">
+            <a:avLst/>
+          </a:prstGeom>
+          <a:noFill/>
+        </p:spPr>
+        <p:txBody>
+          <a:bodyPr wrap="square" rtlCol="0">
+            <a:spAutoFit/>
+          </a:bodyPr>
+          <a:lstStyle/>
+          <a:p>
+            <a:pPr algn="ctr"/>
+            <a:r>
+              <a:rPr lang="en-US" dirty="0"/>
+              <a:t>23</a:t>
+            </a:r>
+          </a:p>
+        </p:txBody>
+      </p:sp>
+      <p:sp>
+        <p:nvSpPr>
+          <p:cNvPr id="8" name="Oval 7">
+            <a:extLst>
+              <a:ext uri="{FF2B5EF4-FFF2-40B4-BE49-F238E27FC236}">
+                <a16:creationId xmlns:a16="http://schemas.microsoft.com/office/drawing/2014/main" id="{8EA25494-02E1-49E1-8C13-E1F29649380E}"/>
+              </a:ext>
+            </a:extLst>
+          </p:cNvPr>
+          <p:cNvSpPr/>
+          <p:nvPr/>
+        </p:nvSpPr>
+        <p:spPr>
+          <a:xfrm>
+            <a:off x="3905596" y="1683327"/>
+            <a:ext cx="640121" cy="166256"/>
+          </a:xfrm>
+          <a:prstGeom prst="ellipse">
+            <a:avLst/>
+          </a:prstGeom>
+          <a:noFill/>
+          <a:ln w="28575">
+            <a:solidFill>
+              <a:srgbClr val="FF0000"/>
+            </a:solidFill>
+          </a:ln>
+        </p:spPr>
+        <p:style>
+          <a:lnRef idx="2">
+            <a:schemeClr val="accent1">
+              <a:shade val="50000"/>
+            </a:schemeClr>
+          </a:lnRef>
+          <a:fillRef idx="1">
+            <a:schemeClr val="accent1"/>
+          </a:fillRef>
+          <a:effectRef idx="0">
+            <a:schemeClr val="accent1"/>
+          </a:effectRef>
+          <a:fontRef idx="minor">
+            <a:schemeClr val="lt1"/>
+          </a:fontRef>
+        </p:style>
+        <p:txBody>
+          <a:bodyPr rtlCol="0" anchor="ctr"/>
+          <a:lstStyle/>
+          <a:p>
+            <a:pPr algn="ctr"/>
+            <a:endParaRPr lang="en-US" dirty="0"/>
+          </a:p>
+        </p:txBody>
+      </p:sp>
+      <p:sp>
+        <p:nvSpPr>
+          <p:cNvPr id="9" name="TextBox 8">
+            <a:extLst>
+              <a:ext uri="{FF2B5EF4-FFF2-40B4-BE49-F238E27FC236}">
+                <a16:creationId xmlns:a16="http://schemas.microsoft.com/office/drawing/2014/main" id="{5D989B60-42A6-4EEA-8A08-1100206691B7}"/>
+              </a:ext>
+            </a:extLst>
+          </p:cNvPr>
+          <p:cNvSpPr txBox="1"/>
+          <p:nvPr/>
+        </p:nvSpPr>
+        <p:spPr>
+          <a:xfrm>
+            <a:off x="4139820" y="1581789"/>
+            <a:ext cx="1152533" cy="369332"/>
+          </a:xfrm>
+          <a:prstGeom prst="rect">
+            <a:avLst/>
+          </a:prstGeom>
+          <a:noFill/>
+        </p:spPr>
+        <p:txBody>
+          <a:bodyPr wrap="square" rtlCol="0">
+            <a:spAutoFit/>
+          </a:bodyPr>
+          <a:lstStyle/>
+          <a:p>
+            <a:pPr algn="ctr"/>
+            <a:r>
+              <a:rPr lang="en-US" dirty="0"/>
+              <a:t>24</a:t>
+            </a:r>
+          </a:p>
+        </p:txBody>
+      </p:sp>
+      <p:pic>
+        <p:nvPicPr>
+          <p:cNvPr id="11" name="Picture 10">
+            <a:extLst>
+              <a:ext uri="{FF2B5EF4-FFF2-40B4-BE49-F238E27FC236}">
+                <a16:creationId xmlns:a16="http://schemas.microsoft.com/office/drawing/2014/main" id="{9D81CF49-0624-485E-B8B8-A7319D661D3B}"/>
+              </a:ext>
+            </a:extLst>
+          </p:cNvPr>
+          <p:cNvPicPr>
+            <a:picLocks noChangeAspect="1"/>
+          </p:cNvPicPr>
+          <p:nvPr/>
+        </p:nvPicPr>
+        <p:blipFill>
+          <a:blip r:embed="rId3"/>
+          <a:stretch>
+            <a:fillRect/>
+          </a:stretch>
+        </p:blipFill>
+        <p:spPr>
+          <a:xfrm>
+            <a:off x="5677479" y="1849583"/>
+            <a:ext cx="4509770" cy="2869600"/>
+          </a:xfrm>
+          <a:prstGeom prst="rect">
+            <a:avLst/>
+          </a:prstGeom>
+        </p:spPr>
+      </p:pic>
+      <p:cxnSp>
+        <p:nvCxnSpPr>
+          <p:cNvPr id="12" name="Straight Arrow Connector 11">
+            <a:extLst>
+              <a:ext uri="{FF2B5EF4-FFF2-40B4-BE49-F238E27FC236}">
+                <a16:creationId xmlns:a16="http://schemas.microsoft.com/office/drawing/2014/main" id="{C74BE805-A7AE-49B0-B291-393B6F411803}"/>
+              </a:ext>
+            </a:extLst>
+          </p:cNvPr>
+          <p:cNvCxnSpPr/>
+          <p:nvPr/>
+        </p:nvCxnSpPr>
+        <p:spPr>
+          <a:xfrm>
+            <a:off x="5292353" y="2739043"/>
+            <a:ext cx="340822" cy="0"/>
+          </a:xfrm>
+          <a:prstGeom prst="straightConnector1">
+            <a:avLst/>
+          </a:prstGeom>
+          <a:ln w="28575">
+            <a:solidFill>
+              <a:srgbClr val="FF0000"/>
+            </a:solidFill>
+            <a:tailEnd type="triangle"/>
+          </a:ln>
+        </p:spPr>
+        <p:style>
+          <a:lnRef idx="1">
+            <a:schemeClr val="accent1"/>
+          </a:lnRef>
+          <a:fillRef idx="0">
+            <a:schemeClr val="accent1"/>
+          </a:fillRef>
+          <a:effectRef idx="0">
+            <a:schemeClr val="accent1"/>
+          </a:effectRef>
+          <a:fontRef idx="minor">
+            <a:schemeClr val="tx1"/>
+          </a:fontRef>
+        </p:style>
+      </p:cxnSp>
+    </p:spTree>
+    <p:extLst>
+      <p:ext uri="{BB962C8B-B14F-4D97-AF65-F5344CB8AC3E}">
+        <p14:creationId xmlns:p14="http://schemas.microsoft.com/office/powerpoint/2010/main" val="1974805801"/>
+      </p:ext>
+    </p:extLst>
+  </p:cSld>
+  <p:clrMapOvr>
+    <a:masterClrMapping/>
+  </p:clrMapOvr>
+</p:sld>
+</file>
+
+<file path=ppt/slides/slide12.xml><?xml version="1.0" encoding="utf-8"?>
+<p:sld xmlns:a="http://schemas.openxmlformats.org/drawingml/2006/main" xmlns:r="http://schemas.openxmlformats.org/officeDocument/2006/relationships" xmlns:p="http://schemas.openxmlformats.org/presentationml/2006/main">
+  <p:cSld>
+    <p:spTree>
+      <p:nvGrpSpPr>
+        <p:cNvPr id="1" name=""/>
+        <p:cNvGrpSpPr/>
+        <p:nvPr/>
+      </p:nvGrpSpPr>
+      <p:grpSpPr>
+        <a:xfrm>
+          <a:off x="0" y="0"/>
+          <a:ext cx="0" cy="0"/>
+          <a:chOff x="0" y="0"/>
+          <a:chExt cx="0" cy="0"/>
+        </a:xfrm>
+      </p:grpSpPr>
+      <p:pic>
+        <p:nvPicPr>
+          <p:cNvPr id="3" name="Picture 2">
+            <a:extLst>
+              <a:ext uri="{FF2B5EF4-FFF2-40B4-BE49-F238E27FC236}">
+                <a16:creationId xmlns:a16="http://schemas.microsoft.com/office/drawing/2014/main" id="{A6BBB7B7-C262-4E91-9D98-A884A1D6DE78}"/>
+              </a:ext>
+            </a:extLst>
+          </p:cNvPr>
+          <p:cNvPicPr>
+            <a:picLocks noChangeAspect="1"/>
+          </p:cNvPicPr>
+          <p:nvPr/>
+        </p:nvPicPr>
+        <p:blipFill>
+          <a:blip r:embed="rId2"/>
+          <a:stretch>
+            <a:fillRect/>
+          </a:stretch>
+        </p:blipFill>
+        <p:spPr>
+          <a:xfrm>
+            <a:off x="326865" y="823672"/>
+            <a:ext cx="3028972" cy="4791110"/>
+          </a:xfrm>
+          <a:prstGeom prst="rect">
+            <a:avLst/>
+          </a:prstGeom>
+        </p:spPr>
+      </p:pic>
+      <p:sp>
+        <p:nvSpPr>
+          <p:cNvPr id="4" name="Oval 3">
+            <a:extLst>
+              <a:ext uri="{FF2B5EF4-FFF2-40B4-BE49-F238E27FC236}">
+                <a16:creationId xmlns:a16="http://schemas.microsoft.com/office/drawing/2014/main" id="{2C1F7354-1FAD-4F36-A363-15C9398CA09A}"/>
+              </a:ext>
+            </a:extLst>
+          </p:cNvPr>
+          <p:cNvSpPr/>
+          <p:nvPr/>
+        </p:nvSpPr>
+        <p:spPr>
+          <a:xfrm>
+            <a:off x="2095785" y="1107140"/>
+            <a:ext cx="465513" cy="375459"/>
+          </a:xfrm>
+          <a:prstGeom prst="ellipse">
+            <a:avLst/>
+          </a:prstGeom>
+          <a:noFill/>
+          <a:ln w="28575">
+            <a:solidFill>
+              <a:srgbClr val="FF0000"/>
+            </a:solidFill>
+          </a:ln>
+        </p:spPr>
+        <p:style>
+          <a:lnRef idx="2">
+            <a:schemeClr val="accent1">
+              <a:shade val="50000"/>
+            </a:schemeClr>
+          </a:lnRef>
+          <a:fillRef idx="1">
+            <a:schemeClr val="accent1"/>
+          </a:fillRef>
+          <a:effectRef idx="0">
+            <a:schemeClr val="accent1"/>
+          </a:effectRef>
+          <a:fontRef idx="minor">
+            <a:schemeClr val="lt1"/>
+          </a:fontRef>
+        </p:style>
+        <p:txBody>
+          <a:bodyPr rtlCol="0" anchor="ctr"/>
+          <a:lstStyle/>
+          <a:p>
+            <a:pPr algn="ctr"/>
+            <a:endParaRPr lang="en-US" dirty="0"/>
+          </a:p>
+        </p:txBody>
+      </p:sp>
+      <p:sp>
+        <p:nvSpPr>
+          <p:cNvPr id="5" name="Oval 4">
+            <a:extLst>
+              <a:ext uri="{FF2B5EF4-FFF2-40B4-BE49-F238E27FC236}">
+                <a16:creationId xmlns:a16="http://schemas.microsoft.com/office/drawing/2014/main" id="{BCE968F1-7CA7-47CF-B875-257B2C2954AD}"/>
+              </a:ext>
+            </a:extLst>
+          </p:cNvPr>
+          <p:cNvSpPr/>
+          <p:nvPr/>
+        </p:nvSpPr>
+        <p:spPr>
+          <a:xfrm>
+            <a:off x="2200509" y="1538100"/>
+            <a:ext cx="640121" cy="166256"/>
+          </a:xfrm>
+          <a:prstGeom prst="ellipse">
+            <a:avLst/>
+          </a:prstGeom>
+          <a:noFill/>
+          <a:ln w="28575">
+            <a:solidFill>
+              <a:srgbClr val="FF0000"/>
+            </a:solidFill>
+          </a:ln>
+        </p:spPr>
+        <p:style>
+          <a:lnRef idx="2">
+            <a:schemeClr val="accent1">
+              <a:shade val="50000"/>
+            </a:schemeClr>
+          </a:lnRef>
+          <a:fillRef idx="1">
+            <a:schemeClr val="accent1"/>
+          </a:fillRef>
+          <a:effectRef idx="0">
+            <a:schemeClr val="accent1"/>
+          </a:effectRef>
+          <a:fontRef idx="minor">
+            <a:schemeClr val="lt1"/>
+          </a:fontRef>
+        </p:style>
+        <p:txBody>
+          <a:bodyPr rtlCol="0" anchor="ctr"/>
+          <a:lstStyle/>
+          <a:p>
+            <a:pPr algn="ctr"/>
+            <a:endParaRPr lang="en-US" dirty="0"/>
+          </a:p>
+        </p:txBody>
+      </p:sp>
+      <p:sp>
+        <p:nvSpPr>
+          <p:cNvPr id="6" name="TextBox 5">
+            <a:extLst>
+              <a:ext uri="{FF2B5EF4-FFF2-40B4-BE49-F238E27FC236}">
+                <a16:creationId xmlns:a16="http://schemas.microsoft.com/office/drawing/2014/main" id="{51357FBF-A740-411C-869A-96676751D211}"/>
+              </a:ext>
+            </a:extLst>
+          </p:cNvPr>
+          <p:cNvSpPr txBox="1"/>
+          <p:nvPr/>
+        </p:nvSpPr>
+        <p:spPr>
+          <a:xfrm>
+            <a:off x="2447891" y="1436562"/>
+            <a:ext cx="1152533" cy="369332"/>
+          </a:xfrm>
+          <a:prstGeom prst="rect">
+            <a:avLst/>
+          </a:prstGeom>
+          <a:noFill/>
+        </p:spPr>
+        <p:txBody>
+          <a:bodyPr wrap="square" rtlCol="0">
+            <a:spAutoFit/>
+          </a:bodyPr>
+          <a:lstStyle/>
+          <a:p>
+            <a:pPr algn="ctr"/>
+            <a:r>
+              <a:rPr lang="en-US" dirty="0"/>
+              <a:t>26</a:t>
+            </a:r>
+          </a:p>
+        </p:txBody>
+      </p:sp>
+      <p:sp>
+        <p:nvSpPr>
+          <p:cNvPr id="7" name="TextBox 6">
+            <a:extLst>
+              <a:ext uri="{FF2B5EF4-FFF2-40B4-BE49-F238E27FC236}">
+                <a16:creationId xmlns:a16="http://schemas.microsoft.com/office/drawing/2014/main" id="{5639F835-077D-4136-83AC-7B1A7A49FB45}"/>
+              </a:ext>
+            </a:extLst>
+          </p:cNvPr>
+          <p:cNvSpPr txBox="1"/>
+          <p:nvPr/>
+        </p:nvSpPr>
+        <p:spPr>
+          <a:xfrm>
+            <a:off x="1831163" y="737564"/>
+            <a:ext cx="1152533" cy="369332"/>
+          </a:xfrm>
+          <a:prstGeom prst="rect">
+            <a:avLst/>
+          </a:prstGeom>
+          <a:noFill/>
+        </p:spPr>
+        <p:txBody>
+          <a:bodyPr wrap="square" rtlCol="0">
+            <a:spAutoFit/>
+          </a:bodyPr>
+          <a:lstStyle/>
+          <a:p>
+            <a:pPr algn="ctr"/>
+            <a:r>
+              <a:rPr lang="en-US" dirty="0"/>
+              <a:t>25</a:t>
+            </a:r>
+          </a:p>
+        </p:txBody>
+      </p:sp>
+      <p:pic>
+        <p:nvPicPr>
+          <p:cNvPr id="9" name="Picture 8">
+            <a:extLst>
+              <a:ext uri="{FF2B5EF4-FFF2-40B4-BE49-F238E27FC236}">
+                <a16:creationId xmlns:a16="http://schemas.microsoft.com/office/drawing/2014/main" id="{9582921A-A174-4942-8D48-0C096EE0D8CE}"/>
+              </a:ext>
+            </a:extLst>
+          </p:cNvPr>
+          <p:cNvPicPr>
+            <a:picLocks noChangeAspect="1"/>
+          </p:cNvPicPr>
+          <p:nvPr/>
+        </p:nvPicPr>
+        <p:blipFill>
+          <a:blip r:embed="rId3"/>
+          <a:stretch>
+            <a:fillRect/>
+          </a:stretch>
+        </p:blipFill>
+        <p:spPr>
+          <a:xfrm>
+            <a:off x="3845012" y="2031310"/>
+            <a:ext cx="1704987" cy="2547956"/>
+          </a:xfrm>
+          <a:prstGeom prst="rect">
+            <a:avLst/>
+          </a:prstGeom>
+        </p:spPr>
+      </p:pic>
+      <p:sp>
+        <p:nvSpPr>
+          <p:cNvPr id="10" name="Oval 9">
+            <a:extLst>
+              <a:ext uri="{FF2B5EF4-FFF2-40B4-BE49-F238E27FC236}">
+                <a16:creationId xmlns:a16="http://schemas.microsoft.com/office/drawing/2014/main" id="{BCEBCEC5-18DF-49B5-9B47-B38C590532DB}"/>
+              </a:ext>
+            </a:extLst>
+          </p:cNvPr>
+          <p:cNvSpPr/>
+          <p:nvPr/>
+        </p:nvSpPr>
+        <p:spPr>
+          <a:xfrm>
+            <a:off x="3829487" y="3052971"/>
+            <a:ext cx="737134" cy="142051"/>
+          </a:xfrm>
+          <a:prstGeom prst="ellipse">
+            <a:avLst/>
+          </a:prstGeom>
+          <a:noFill/>
+          <a:ln w="28575">
+            <a:solidFill>
+              <a:srgbClr val="FF0000"/>
+            </a:solidFill>
+          </a:ln>
+        </p:spPr>
+        <p:style>
+          <a:lnRef idx="2">
+            <a:schemeClr val="accent1">
+              <a:shade val="50000"/>
+            </a:schemeClr>
+          </a:lnRef>
+          <a:fillRef idx="1">
+            <a:schemeClr val="accent1"/>
+          </a:fillRef>
+          <a:effectRef idx="0">
+            <a:schemeClr val="accent1"/>
+          </a:effectRef>
+          <a:fontRef idx="minor">
+            <a:schemeClr val="lt1"/>
+          </a:fontRef>
+        </p:style>
+        <p:txBody>
+          <a:bodyPr rtlCol="0" anchor="ctr"/>
+          <a:lstStyle/>
+          <a:p>
+            <a:pPr algn="ctr"/>
+            <a:endParaRPr lang="en-US" dirty="0"/>
+          </a:p>
+        </p:txBody>
+      </p:sp>
+      <p:sp>
+        <p:nvSpPr>
+          <p:cNvPr id="11" name="Oval 10">
+            <a:extLst>
+              <a:ext uri="{FF2B5EF4-FFF2-40B4-BE49-F238E27FC236}">
+                <a16:creationId xmlns:a16="http://schemas.microsoft.com/office/drawing/2014/main" id="{532FBCB7-C8FE-4586-9F36-040EA721E18D}"/>
+              </a:ext>
+            </a:extLst>
+          </p:cNvPr>
+          <p:cNvSpPr/>
+          <p:nvPr/>
+        </p:nvSpPr>
+        <p:spPr>
+          <a:xfrm>
+            <a:off x="4394499" y="3479691"/>
+            <a:ext cx="306594" cy="142051"/>
+          </a:xfrm>
+          <a:prstGeom prst="ellipse">
+            <a:avLst/>
+          </a:prstGeom>
+          <a:noFill/>
+          <a:ln w="28575">
+            <a:solidFill>
+              <a:srgbClr val="FF0000"/>
+            </a:solidFill>
+          </a:ln>
+        </p:spPr>
+        <p:style>
+          <a:lnRef idx="2">
+            <a:schemeClr val="accent1">
+              <a:shade val="50000"/>
+            </a:schemeClr>
+          </a:lnRef>
+          <a:fillRef idx="1">
+            <a:schemeClr val="accent1"/>
+          </a:fillRef>
+          <a:effectRef idx="0">
+            <a:schemeClr val="accent1"/>
+          </a:effectRef>
+          <a:fontRef idx="minor">
+            <a:schemeClr val="lt1"/>
+          </a:fontRef>
+        </p:style>
+        <p:txBody>
+          <a:bodyPr rtlCol="0" anchor="ctr"/>
+          <a:lstStyle/>
+          <a:p>
+            <a:pPr algn="ctr"/>
+            <a:endParaRPr lang="en-US" dirty="0"/>
+          </a:p>
+        </p:txBody>
+      </p:sp>
+      <p:sp>
+        <p:nvSpPr>
+          <p:cNvPr id="12" name="Oval 11">
+            <a:extLst>
+              <a:ext uri="{FF2B5EF4-FFF2-40B4-BE49-F238E27FC236}">
+                <a16:creationId xmlns:a16="http://schemas.microsoft.com/office/drawing/2014/main" id="{E64522AB-6EE8-4D04-A5AF-CBF40376A4D7}"/>
+              </a:ext>
+            </a:extLst>
+          </p:cNvPr>
+          <p:cNvSpPr/>
+          <p:nvPr/>
+        </p:nvSpPr>
+        <p:spPr>
+          <a:xfrm>
+            <a:off x="3891460" y="3938684"/>
+            <a:ext cx="599858" cy="142051"/>
+          </a:xfrm>
+          <a:prstGeom prst="ellipse">
+            <a:avLst/>
+          </a:prstGeom>
+          <a:noFill/>
+          <a:ln w="28575">
+            <a:solidFill>
+              <a:srgbClr val="FF0000"/>
+            </a:solidFill>
+          </a:ln>
+        </p:spPr>
+        <p:style>
+          <a:lnRef idx="2">
+            <a:schemeClr val="accent1">
+              <a:shade val="50000"/>
+            </a:schemeClr>
+          </a:lnRef>
+          <a:fillRef idx="1">
+            <a:schemeClr val="accent1"/>
+          </a:fillRef>
+          <a:effectRef idx="0">
+            <a:schemeClr val="accent1"/>
+          </a:effectRef>
+          <a:fontRef idx="minor">
+            <a:schemeClr val="lt1"/>
+          </a:fontRef>
+        </p:style>
+        <p:txBody>
+          <a:bodyPr rtlCol="0" anchor="ctr"/>
+          <a:lstStyle/>
+          <a:p>
+            <a:pPr algn="ctr"/>
+            <a:endParaRPr lang="en-US" dirty="0"/>
+          </a:p>
+        </p:txBody>
+      </p:sp>
+      <p:sp>
+        <p:nvSpPr>
+          <p:cNvPr id="13" name="TextBox 12">
+            <a:extLst>
+              <a:ext uri="{FF2B5EF4-FFF2-40B4-BE49-F238E27FC236}">
+                <a16:creationId xmlns:a16="http://schemas.microsoft.com/office/drawing/2014/main" id="{5E4E6DF1-8389-47C9-90D5-BFBDFB8321B6}"/>
+              </a:ext>
+            </a:extLst>
+          </p:cNvPr>
+          <p:cNvSpPr txBox="1"/>
+          <p:nvPr/>
+        </p:nvSpPr>
+        <p:spPr>
+          <a:xfrm>
+            <a:off x="4191389" y="2923194"/>
+            <a:ext cx="1152533" cy="369332"/>
+          </a:xfrm>
+          <a:prstGeom prst="rect">
+            <a:avLst/>
+          </a:prstGeom>
+          <a:noFill/>
+        </p:spPr>
+        <p:txBody>
+          <a:bodyPr wrap="square" rtlCol="0">
+            <a:spAutoFit/>
+          </a:bodyPr>
+          <a:lstStyle/>
+          <a:p>
+            <a:pPr algn="ctr"/>
+            <a:r>
+              <a:rPr lang="en-US" dirty="0"/>
+              <a:t>27</a:t>
+            </a:r>
+          </a:p>
+        </p:txBody>
+      </p:sp>
+      <p:sp>
+        <p:nvSpPr>
+          <p:cNvPr id="14" name="TextBox 13">
+            <a:extLst>
+              <a:ext uri="{FF2B5EF4-FFF2-40B4-BE49-F238E27FC236}">
+                <a16:creationId xmlns:a16="http://schemas.microsoft.com/office/drawing/2014/main" id="{8151A177-1112-4B85-ACF2-21BFB6667D5C}"/>
+              </a:ext>
+            </a:extLst>
+          </p:cNvPr>
+          <p:cNvSpPr txBox="1"/>
+          <p:nvPr/>
+        </p:nvSpPr>
+        <p:spPr>
+          <a:xfrm>
+            <a:off x="4343789" y="3381898"/>
+            <a:ext cx="1152533" cy="369332"/>
+          </a:xfrm>
+          <a:prstGeom prst="rect">
+            <a:avLst/>
+          </a:prstGeom>
+          <a:noFill/>
+        </p:spPr>
+        <p:txBody>
+          <a:bodyPr wrap="square" rtlCol="0">
+            <a:spAutoFit/>
+          </a:bodyPr>
+          <a:lstStyle/>
+          <a:p>
+            <a:pPr algn="ctr"/>
+            <a:r>
+              <a:rPr lang="en-US" dirty="0"/>
+              <a:t>28</a:t>
+            </a:r>
+          </a:p>
+        </p:txBody>
+      </p:sp>
+      <p:sp>
+        <p:nvSpPr>
+          <p:cNvPr id="15" name="TextBox 14">
+            <a:extLst>
+              <a:ext uri="{FF2B5EF4-FFF2-40B4-BE49-F238E27FC236}">
+                <a16:creationId xmlns:a16="http://schemas.microsoft.com/office/drawing/2014/main" id="{ED41BC14-DA6C-4118-87DE-E58223E028B2}"/>
+              </a:ext>
+            </a:extLst>
+          </p:cNvPr>
+          <p:cNvSpPr txBox="1"/>
+          <p:nvPr/>
+        </p:nvSpPr>
+        <p:spPr>
+          <a:xfrm>
+            <a:off x="3113831" y="3818241"/>
+            <a:ext cx="1152533" cy="369332"/>
+          </a:xfrm>
+          <a:prstGeom prst="rect">
+            <a:avLst/>
+          </a:prstGeom>
+          <a:noFill/>
+        </p:spPr>
+        <p:txBody>
+          <a:bodyPr wrap="square" rtlCol="0">
+            <a:spAutoFit/>
+          </a:bodyPr>
+          <a:lstStyle/>
+          <a:p>
+            <a:pPr algn="ctr"/>
+            <a:r>
+              <a:rPr lang="en-US" dirty="0"/>
+              <a:t>29</a:t>
+            </a:r>
+          </a:p>
+        </p:txBody>
+      </p:sp>
+      <p:cxnSp>
+        <p:nvCxnSpPr>
+          <p:cNvPr id="16" name="Straight Arrow Connector 15">
+            <a:extLst>
+              <a:ext uri="{FF2B5EF4-FFF2-40B4-BE49-F238E27FC236}">
+                <a16:creationId xmlns:a16="http://schemas.microsoft.com/office/drawing/2014/main" id="{1DD50AF0-C1DD-4558-9CD2-436FF23E5A3A}"/>
+              </a:ext>
+            </a:extLst>
+          </p:cNvPr>
+          <p:cNvCxnSpPr/>
+          <p:nvPr/>
+        </p:nvCxnSpPr>
+        <p:spPr>
+          <a:xfrm>
+            <a:off x="3430013" y="3376930"/>
+            <a:ext cx="340822" cy="0"/>
+          </a:xfrm>
+          <a:prstGeom prst="straightConnector1">
+            <a:avLst/>
+          </a:prstGeom>
+          <a:ln w="28575">
+            <a:solidFill>
+              <a:srgbClr val="FF0000"/>
+            </a:solidFill>
+            <a:tailEnd type="triangle"/>
+          </a:ln>
+        </p:spPr>
+        <p:style>
+          <a:lnRef idx="1">
+            <a:schemeClr val="accent1"/>
+          </a:lnRef>
+          <a:fillRef idx="0">
+            <a:schemeClr val="accent1"/>
+          </a:fillRef>
+          <a:effectRef idx="0">
+            <a:schemeClr val="accent1"/>
+          </a:effectRef>
+          <a:fontRef idx="minor">
+            <a:schemeClr val="tx1"/>
+          </a:fontRef>
+        </p:style>
+      </p:cxnSp>
+      <p:pic>
+        <p:nvPicPr>
+          <p:cNvPr id="18" name="Picture 17">
+            <a:extLst>
+              <a:ext uri="{FF2B5EF4-FFF2-40B4-BE49-F238E27FC236}">
+                <a16:creationId xmlns:a16="http://schemas.microsoft.com/office/drawing/2014/main" id="{B480EFC5-F508-4A85-BD37-417D3353A2BE}"/>
+              </a:ext>
+            </a:extLst>
+          </p:cNvPr>
+          <p:cNvPicPr>
+            <a:picLocks noChangeAspect="1"/>
+          </p:cNvPicPr>
+          <p:nvPr/>
+        </p:nvPicPr>
+        <p:blipFill rotWithShape="1">
+          <a:blip r:embed="rId4"/>
+          <a:srcRect l="11045"/>
+          <a:stretch/>
+        </p:blipFill>
+        <p:spPr>
+          <a:xfrm>
+            <a:off x="5842699" y="1626652"/>
+            <a:ext cx="5401556" cy="3848128"/>
+          </a:xfrm>
+          <a:prstGeom prst="rect">
+            <a:avLst/>
+          </a:prstGeom>
+        </p:spPr>
+      </p:pic>
+      <p:cxnSp>
+        <p:nvCxnSpPr>
+          <p:cNvPr id="19" name="Straight Arrow Connector 18">
+            <a:extLst>
+              <a:ext uri="{FF2B5EF4-FFF2-40B4-BE49-F238E27FC236}">
+                <a16:creationId xmlns:a16="http://schemas.microsoft.com/office/drawing/2014/main" id="{4439B55D-6A69-47D0-8DF9-2FE7E2D6706F}"/>
+              </a:ext>
+            </a:extLst>
+          </p:cNvPr>
+          <p:cNvCxnSpPr/>
+          <p:nvPr/>
+        </p:nvCxnSpPr>
+        <p:spPr>
+          <a:xfrm>
+            <a:off x="5620987" y="3376930"/>
+            <a:ext cx="340822" cy="0"/>
+          </a:xfrm>
+          <a:prstGeom prst="straightConnector1">
+            <a:avLst/>
+          </a:prstGeom>
+          <a:ln w="28575">
+            <a:solidFill>
+              <a:srgbClr val="FF0000"/>
+            </a:solidFill>
+            <a:tailEnd type="triangle"/>
+          </a:ln>
+        </p:spPr>
+        <p:style>
+          <a:lnRef idx="1">
+            <a:schemeClr val="accent1"/>
+          </a:lnRef>
+          <a:fillRef idx="0">
+            <a:schemeClr val="accent1"/>
+          </a:fillRef>
+          <a:effectRef idx="0">
+            <a:schemeClr val="accent1"/>
+          </a:effectRef>
+          <a:fontRef idx="minor">
+            <a:schemeClr val="tx1"/>
+          </a:fontRef>
+        </p:style>
+      </p:cxnSp>
+    </p:spTree>
+    <p:extLst>
+      <p:ext uri="{BB962C8B-B14F-4D97-AF65-F5344CB8AC3E}">
+        <p14:creationId xmlns:p14="http://schemas.microsoft.com/office/powerpoint/2010/main" val="1476021301"/>
+      </p:ext>
+    </p:extLst>
+  </p:cSld>
+  <p:clrMapOvr>
+    <a:masterClrMapping/>
+  </p:clrMapOvr>
+</p:sld>
+</file>
+
+<file path=ppt/slides/slide13.xml><?xml version="1.0" encoding="utf-8"?>
+<p:sld xmlns:a="http://schemas.openxmlformats.org/drawingml/2006/main" xmlns:r="http://schemas.openxmlformats.org/officeDocument/2006/relationships" xmlns:p="http://schemas.openxmlformats.org/presentationml/2006/main">
+  <p:cSld>
+    <p:spTree>
+      <p:nvGrpSpPr>
+        <p:cNvPr id="1" name=""/>
+        <p:cNvGrpSpPr/>
+        <p:nvPr/>
+      </p:nvGrpSpPr>
+      <p:grpSpPr>
+        <a:xfrm>
+          <a:off x="0" y="0"/>
+          <a:ext cx="0" cy="0"/>
+          <a:chOff x="0" y="0"/>
+          <a:chExt cx="0" cy="0"/>
+        </a:xfrm>
+      </p:grpSpPr>
+      <p:pic>
+        <p:nvPicPr>
+          <p:cNvPr id="3" name="Picture 2">
+            <a:extLst>
+              <a:ext uri="{FF2B5EF4-FFF2-40B4-BE49-F238E27FC236}">
+                <a16:creationId xmlns:a16="http://schemas.microsoft.com/office/drawing/2014/main" id="{DD1EBD20-AEB5-4886-866D-ECA8F0A6BC6B}"/>
+              </a:ext>
+            </a:extLst>
+          </p:cNvPr>
+          <p:cNvPicPr>
+            <a:picLocks noChangeAspect="1"/>
+          </p:cNvPicPr>
+          <p:nvPr/>
+        </p:nvPicPr>
+        <p:blipFill>
+          <a:blip r:embed="rId2"/>
+          <a:stretch>
+            <a:fillRect/>
+          </a:stretch>
+        </p:blipFill>
+        <p:spPr>
+          <a:xfrm>
+            <a:off x="3093222" y="2197884"/>
+            <a:ext cx="6005556" cy="2462231"/>
+          </a:xfrm>
+          <a:prstGeom prst="rect">
+            <a:avLst/>
+          </a:prstGeom>
+        </p:spPr>
+      </p:pic>
+      <p:sp>
+        <p:nvSpPr>
+          <p:cNvPr id="4" name="Oval 3">
+            <a:extLst>
+              <a:ext uri="{FF2B5EF4-FFF2-40B4-BE49-F238E27FC236}">
+                <a16:creationId xmlns:a16="http://schemas.microsoft.com/office/drawing/2014/main" id="{AC898566-C6A2-44A8-A96D-8A77F1A823CC}"/>
+              </a:ext>
+            </a:extLst>
+          </p:cNvPr>
+          <p:cNvSpPr/>
+          <p:nvPr/>
+        </p:nvSpPr>
+        <p:spPr>
+          <a:xfrm>
+            <a:off x="6271708" y="2333512"/>
+            <a:ext cx="355981" cy="375459"/>
+          </a:xfrm>
+          <a:prstGeom prst="ellipse">
+            <a:avLst/>
+          </a:prstGeom>
+          <a:noFill/>
+          <a:ln w="28575">
+            <a:solidFill>
+              <a:srgbClr val="FF0000"/>
+            </a:solidFill>
+          </a:ln>
+        </p:spPr>
+        <p:style>
+          <a:lnRef idx="2">
+            <a:schemeClr val="accent1">
+              <a:shade val="50000"/>
+            </a:schemeClr>
+          </a:lnRef>
+          <a:fillRef idx="1">
+            <a:schemeClr val="accent1"/>
+          </a:fillRef>
+          <a:effectRef idx="0">
+            <a:schemeClr val="accent1"/>
+          </a:effectRef>
+          <a:fontRef idx="minor">
+            <a:schemeClr val="lt1"/>
+          </a:fontRef>
+        </p:style>
+        <p:txBody>
+          <a:bodyPr rtlCol="0" anchor="ctr"/>
+          <a:lstStyle/>
+          <a:p>
+            <a:pPr algn="ctr"/>
+            <a:endParaRPr lang="en-US" dirty="0"/>
+          </a:p>
+        </p:txBody>
+      </p:sp>
+      <p:sp>
+        <p:nvSpPr>
+          <p:cNvPr id="5" name="Oval 4">
+            <a:extLst>
+              <a:ext uri="{FF2B5EF4-FFF2-40B4-BE49-F238E27FC236}">
+                <a16:creationId xmlns:a16="http://schemas.microsoft.com/office/drawing/2014/main" id="{183E22EA-2A46-49C2-80F5-FA3FB14C3005}"/>
+              </a:ext>
+            </a:extLst>
+          </p:cNvPr>
+          <p:cNvSpPr/>
+          <p:nvPr/>
+        </p:nvSpPr>
+        <p:spPr>
+          <a:xfrm>
+            <a:off x="6096000" y="4284656"/>
+            <a:ext cx="355981" cy="375459"/>
+          </a:xfrm>
+          <a:prstGeom prst="ellipse">
+            <a:avLst/>
+          </a:prstGeom>
+          <a:noFill/>
+          <a:ln w="28575">
+            <a:solidFill>
+              <a:srgbClr val="FF0000"/>
+            </a:solidFill>
+          </a:ln>
+        </p:spPr>
+        <p:style>
+          <a:lnRef idx="2">
+            <a:schemeClr val="accent1">
+              <a:shade val="50000"/>
+            </a:schemeClr>
+          </a:lnRef>
+          <a:fillRef idx="1">
+            <a:schemeClr val="accent1"/>
+          </a:fillRef>
+          <a:effectRef idx="0">
+            <a:schemeClr val="accent1"/>
+          </a:effectRef>
+          <a:fontRef idx="minor">
+            <a:schemeClr val="lt1"/>
+          </a:fontRef>
+        </p:style>
+        <p:txBody>
+          <a:bodyPr rtlCol="0" anchor="ctr"/>
+          <a:lstStyle/>
+          <a:p>
+            <a:pPr algn="ctr"/>
+            <a:endParaRPr lang="en-US" dirty="0"/>
+          </a:p>
+        </p:txBody>
+      </p:sp>
+      <p:sp>
+        <p:nvSpPr>
+          <p:cNvPr id="6" name="TextBox 5">
+            <a:extLst>
+              <a:ext uri="{FF2B5EF4-FFF2-40B4-BE49-F238E27FC236}">
+                <a16:creationId xmlns:a16="http://schemas.microsoft.com/office/drawing/2014/main" id="{B5F289E8-722F-4A42-AC8C-3A884AF71417}"/>
+              </a:ext>
+            </a:extLst>
+          </p:cNvPr>
+          <p:cNvSpPr txBox="1"/>
+          <p:nvPr/>
+        </p:nvSpPr>
+        <p:spPr>
+          <a:xfrm>
+            <a:off x="5873431" y="1896366"/>
+            <a:ext cx="1152533" cy="369332"/>
+          </a:xfrm>
+          <a:prstGeom prst="rect">
+            <a:avLst/>
+          </a:prstGeom>
+          <a:noFill/>
+        </p:spPr>
+        <p:txBody>
+          <a:bodyPr wrap="square" rtlCol="0">
+            <a:spAutoFit/>
+          </a:bodyPr>
+          <a:lstStyle/>
+          <a:p>
+            <a:pPr algn="ctr"/>
+            <a:r>
+              <a:rPr lang="en-US" dirty="0"/>
+              <a:t>30</a:t>
+            </a:r>
+          </a:p>
+        </p:txBody>
+      </p:sp>
+      <p:sp>
+        <p:nvSpPr>
+          <p:cNvPr id="7" name="TextBox 6">
+            <a:extLst>
+              <a:ext uri="{FF2B5EF4-FFF2-40B4-BE49-F238E27FC236}">
+                <a16:creationId xmlns:a16="http://schemas.microsoft.com/office/drawing/2014/main" id="{CC0DFEBD-13E4-417A-91C3-701F0F9E47CB}"/>
+              </a:ext>
+            </a:extLst>
+          </p:cNvPr>
+          <p:cNvSpPr txBox="1"/>
+          <p:nvPr/>
+        </p:nvSpPr>
+        <p:spPr>
+          <a:xfrm>
+            <a:off x="5982801" y="4543263"/>
+            <a:ext cx="1152533" cy="369332"/>
+          </a:xfrm>
+          <a:prstGeom prst="rect">
+            <a:avLst/>
+          </a:prstGeom>
+          <a:noFill/>
+        </p:spPr>
+        <p:txBody>
+          <a:bodyPr wrap="square" rtlCol="0">
+            <a:spAutoFit/>
+          </a:bodyPr>
+          <a:lstStyle/>
+          <a:p>
+            <a:pPr algn="ctr"/>
+            <a:r>
+              <a:rPr lang="en-US" dirty="0"/>
+              <a:t>31</a:t>
+            </a:r>
+          </a:p>
+        </p:txBody>
+      </p:sp>
+    </p:spTree>
+    <p:extLst>
+      <p:ext uri="{BB962C8B-B14F-4D97-AF65-F5344CB8AC3E}">
+        <p14:creationId xmlns:p14="http://schemas.microsoft.com/office/powerpoint/2010/main" val="2734403345"/>
+      </p:ext>
+    </p:extLst>
+  </p:cSld>
+  <p:clrMapOvr>
+    <a:masterClrMapping/>
+  </p:clrMapOvr>
+</p:sld>
+</file>
+
+<file path=ppt/slides/slide14.xml><?xml version="1.0" encoding="utf-8"?>
+<p:sld xmlns:a="http://schemas.openxmlformats.org/drawingml/2006/main" xmlns:r="http://schemas.openxmlformats.org/officeDocument/2006/relationships" xmlns:p="http://schemas.openxmlformats.org/presentationml/2006/main">
+  <p:cSld>
+    <p:spTree>
+      <p:nvGrpSpPr>
+        <p:cNvPr id="1" name=""/>
+        <p:cNvGrpSpPr/>
+        <p:nvPr/>
+      </p:nvGrpSpPr>
+      <p:grpSpPr>
+        <a:xfrm>
+          <a:off x="0" y="0"/>
+          <a:ext cx="0" cy="0"/>
+          <a:chOff x="0" y="0"/>
+          <a:chExt cx="0" cy="0"/>
+        </a:xfrm>
+      </p:grpSpPr>
+      <p:pic>
+        <p:nvPicPr>
+          <p:cNvPr id="3" name="Picture 2">
+            <a:extLst>
+              <a:ext uri="{FF2B5EF4-FFF2-40B4-BE49-F238E27FC236}">
+                <a16:creationId xmlns:a16="http://schemas.microsoft.com/office/drawing/2014/main" id="{65222673-3B11-4C89-A66A-94F1B1A486FF}"/>
+              </a:ext>
+            </a:extLst>
+          </p:cNvPr>
+          <p:cNvPicPr>
+            <a:picLocks noChangeAspect="1"/>
+          </p:cNvPicPr>
+          <p:nvPr/>
+        </p:nvPicPr>
+        <p:blipFill>
+          <a:blip r:embed="rId2"/>
+          <a:stretch>
+            <a:fillRect/>
+          </a:stretch>
+        </p:blipFill>
+        <p:spPr>
+          <a:xfrm>
+            <a:off x="2395510" y="1195371"/>
+            <a:ext cx="7400979" cy="4467258"/>
+          </a:xfrm>
+          <a:prstGeom prst="rect">
+            <a:avLst/>
+          </a:prstGeom>
+        </p:spPr>
+      </p:pic>
+      <p:sp>
+        <p:nvSpPr>
+          <p:cNvPr id="4" name="Oval 3">
+            <a:extLst>
+              <a:ext uri="{FF2B5EF4-FFF2-40B4-BE49-F238E27FC236}">
+                <a16:creationId xmlns:a16="http://schemas.microsoft.com/office/drawing/2014/main" id="{127B91F4-CA8B-4F15-89C8-6E1BF51FE2DD}"/>
+              </a:ext>
+            </a:extLst>
+          </p:cNvPr>
+          <p:cNvSpPr/>
+          <p:nvPr/>
+        </p:nvSpPr>
+        <p:spPr>
+          <a:xfrm>
+            <a:off x="2280621" y="2215178"/>
+            <a:ext cx="355981" cy="375459"/>
+          </a:xfrm>
+          <a:prstGeom prst="ellipse">
+            <a:avLst/>
+          </a:prstGeom>
+          <a:noFill/>
+          <a:ln w="28575">
+            <a:solidFill>
+              <a:srgbClr val="FF0000"/>
+            </a:solidFill>
+          </a:ln>
+        </p:spPr>
+        <p:style>
+          <a:lnRef idx="2">
+            <a:schemeClr val="accent1">
+              <a:shade val="50000"/>
+            </a:schemeClr>
+          </a:lnRef>
+          <a:fillRef idx="1">
+            <a:schemeClr val="accent1"/>
+          </a:fillRef>
+          <a:effectRef idx="0">
+            <a:schemeClr val="accent1"/>
+          </a:effectRef>
+          <a:fontRef idx="minor">
+            <a:schemeClr val="lt1"/>
+          </a:fontRef>
+        </p:style>
+        <p:txBody>
+          <a:bodyPr rtlCol="0" anchor="ctr"/>
+          <a:lstStyle/>
+          <a:p>
+            <a:pPr algn="ctr"/>
+            <a:endParaRPr lang="en-US" dirty="0"/>
+          </a:p>
+        </p:txBody>
+      </p:sp>
+      <p:sp>
+        <p:nvSpPr>
+          <p:cNvPr id="5" name="TextBox 4">
+            <a:extLst>
+              <a:ext uri="{FF2B5EF4-FFF2-40B4-BE49-F238E27FC236}">
+                <a16:creationId xmlns:a16="http://schemas.microsoft.com/office/drawing/2014/main" id="{ECDC87E7-D6E1-4912-B56D-218F100DAFA2}"/>
+              </a:ext>
+            </a:extLst>
+          </p:cNvPr>
+          <p:cNvSpPr txBox="1"/>
+          <p:nvPr/>
+        </p:nvSpPr>
+        <p:spPr>
+          <a:xfrm>
+            <a:off x="1532720" y="2215178"/>
+            <a:ext cx="1152533" cy="369332"/>
+          </a:xfrm>
+          <a:prstGeom prst="rect">
+            <a:avLst/>
+          </a:prstGeom>
+          <a:noFill/>
+        </p:spPr>
+        <p:txBody>
+          <a:bodyPr wrap="square" rtlCol="0">
+            <a:spAutoFit/>
+          </a:bodyPr>
+          <a:lstStyle/>
+          <a:p>
+            <a:pPr algn="ctr"/>
+            <a:r>
+              <a:rPr lang="en-US" dirty="0"/>
+              <a:t>32</a:t>
+            </a:r>
+          </a:p>
+        </p:txBody>
+      </p:sp>
+      <p:sp>
+        <p:nvSpPr>
+          <p:cNvPr id="6" name="Oval 5">
+            <a:extLst>
+              <a:ext uri="{FF2B5EF4-FFF2-40B4-BE49-F238E27FC236}">
+                <a16:creationId xmlns:a16="http://schemas.microsoft.com/office/drawing/2014/main" id="{0DD72F2F-3DF3-4935-9729-1D3001E0AF55}"/>
+              </a:ext>
+            </a:extLst>
+          </p:cNvPr>
+          <p:cNvSpPr/>
+          <p:nvPr/>
+        </p:nvSpPr>
+        <p:spPr>
+          <a:xfrm>
+            <a:off x="2917115" y="3994200"/>
+            <a:ext cx="355981" cy="147494"/>
+          </a:xfrm>
+          <a:prstGeom prst="ellipse">
+            <a:avLst/>
+          </a:prstGeom>
+          <a:noFill/>
+          <a:ln w="28575">
+            <a:solidFill>
+              <a:srgbClr val="FF0000"/>
+            </a:solidFill>
+          </a:ln>
+        </p:spPr>
+        <p:style>
+          <a:lnRef idx="2">
+            <a:schemeClr val="accent1">
+              <a:shade val="50000"/>
+            </a:schemeClr>
+          </a:lnRef>
+          <a:fillRef idx="1">
+            <a:schemeClr val="accent1"/>
+          </a:fillRef>
+          <a:effectRef idx="0">
+            <a:schemeClr val="accent1"/>
+          </a:effectRef>
+          <a:fontRef idx="minor">
+            <a:schemeClr val="lt1"/>
+          </a:fontRef>
+        </p:style>
+        <p:txBody>
+          <a:bodyPr rtlCol="0" anchor="ctr"/>
+          <a:lstStyle/>
+          <a:p>
+            <a:pPr algn="ctr"/>
+            <a:endParaRPr lang="en-US" dirty="0"/>
+          </a:p>
+        </p:txBody>
+      </p:sp>
+      <p:sp>
+        <p:nvSpPr>
+          <p:cNvPr id="8" name="TextBox 7">
+            <a:extLst>
+              <a:ext uri="{FF2B5EF4-FFF2-40B4-BE49-F238E27FC236}">
+                <a16:creationId xmlns:a16="http://schemas.microsoft.com/office/drawing/2014/main" id="{D3946170-9378-44EC-BCB4-F5ED30229C1D}"/>
+              </a:ext>
+            </a:extLst>
+          </p:cNvPr>
+          <p:cNvSpPr txBox="1"/>
+          <p:nvPr/>
+        </p:nvSpPr>
+        <p:spPr>
+          <a:xfrm>
+            <a:off x="2174593" y="3809534"/>
+            <a:ext cx="1152533" cy="369332"/>
+          </a:xfrm>
+          <a:prstGeom prst="rect">
+            <a:avLst/>
+          </a:prstGeom>
+          <a:noFill/>
+        </p:spPr>
+        <p:txBody>
+          <a:bodyPr wrap="square" rtlCol="0">
+            <a:spAutoFit/>
+          </a:bodyPr>
+          <a:lstStyle/>
+          <a:p>
+            <a:pPr algn="ctr"/>
+            <a:r>
+              <a:rPr lang="en-US" dirty="0"/>
+              <a:t>33</a:t>
+            </a:r>
+          </a:p>
+        </p:txBody>
+      </p:sp>
+    </p:spTree>
+    <p:extLst>
+      <p:ext uri="{BB962C8B-B14F-4D97-AF65-F5344CB8AC3E}">
+        <p14:creationId xmlns:p14="http://schemas.microsoft.com/office/powerpoint/2010/main" val="3754991500"/>
+      </p:ext>
+    </p:extLst>
+  </p:cSld>
+  <p:clrMapOvr>
+    <a:masterClrMapping/>
+  </p:clrMapOvr>
+</p:sld>
+</file>
+
+<file path=ppt/slides/slide15.xml><?xml version="1.0" encoding="utf-8"?>
+<p:sld xmlns:a="http://schemas.openxmlformats.org/drawingml/2006/main" xmlns:r="http://schemas.openxmlformats.org/officeDocument/2006/relationships" xmlns:p="http://schemas.openxmlformats.org/presentationml/2006/main">
+  <p:cSld>
+    <p:spTree>
+      <p:nvGrpSpPr>
+        <p:cNvPr id="1" name=""/>
+        <p:cNvGrpSpPr/>
+        <p:nvPr/>
+      </p:nvGrpSpPr>
+      <p:grpSpPr>
+        <a:xfrm>
+          <a:off x="0" y="0"/>
+          <a:ext cx="0" cy="0"/>
+          <a:chOff x="0" y="0"/>
+          <a:chExt cx="0" cy="0"/>
+        </a:xfrm>
+      </p:grpSpPr>
+      <p:pic>
+        <p:nvPicPr>
+          <p:cNvPr id="3" name="Picture 2">
+            <a:extLst>
+              <a:ext uri="{FF2B5EF4-FFF2-40B4-BE49-F238E27FC236}">
+                <a16:creationId xmlns:a16="http://schemas.microsoft.com/office/drawing/2014/main" id="{7910AF42-56B5-4E09-B368-950F1DE950B7}"/>
+              </a:ext>
+            </a:extLst>
+          </p:cNvPr>
+          <p:cNvPicPr>
+            <a:picLocks noChangeAspect="1"/>
+          </p:cNvPicPr>
+          <p:nvPr/>
+        </p:nvPicPr>
+        <p:blipFill>
+          <a:blip r:embed="rId2"/>
+          <a:stretch>
+            <a:fillRect/>
+          </a:stretch>
+        </p:blipFill>
+        <p:spPr>
+          <a:xfrm>
+            <a:off x="443342" y="766800"/>
+            <a:ext cx="4829210" cy="4743485"/>
+          </a:xfrm>
+          <a:prstGeom prst="rect">
+            <a:avLst/>
+          </a:prstGeom>
+        </p:spPr>
+      </p:pic>
+      <p:sp>
+        <p:nvSpPr>
+          <p:cNvPr id="5" name="Oval 4">
+            <a:extLst>
+              <a:ext uri="{FF2B5EF4-FFF2-40B4-BE49-F238E27FC236}">
+                <a16:creationId xmlns:a16="http://schemas.microsoft.com/office/drawing/2014/main" id="{A7DCFFB3-7555-4E38-BF07-85646324AAD6}"/>
+              </a:ext>
+            </a:extLst>
+          </p:cNvPr>
+          <p:cNvSpPr/>
+          <p:nvPr/>
+        </p:nvSpPr>
+        <p:spPr>
+          <a:xfrm>
+            <a:off x="763793" y="5195944"/>
+            <a:ext cx="683111" cy="155985"/>
+          </a:xfrm>
+          <a:prstGeom prst="ellipse">
+            <a:avLst/>
+          </a:prstGeom>
+          <a:noFill/>
+          <a:ln w="28575">
+            <a:solidFill>
+              <a:srgbClr val="FF0000"/>
+            </a:solidFill>
+          </a:ln>
+        </p:spPr>
+        <p:style>
+          <a:lnRef idx="2">
+            <a:schemeClr val="accent1">
+              <a:shade val="50000"/>
+            </a:schemeClr>
+          </a:lnRef>
+          <a:fillRef idx="1">
+            <a:schemeClr val="accent1"/>
+          </a:fillRef>
+          <a:effectRef idx="0">
+            <a:schemeClr val="accent1"/>
+          </a:effectRef>
+          <a:fontRef idx="minor">
+            <a:schemeClr val="lt1"/>
+          </a:fontRef>
+        </p:style>
+        <p:txBody>
+          <a:bodyPr rtlCol="0" anchor="ctr"/>
+          <a:lstStyle/>
+          <a:p>
+            <a:pPr algn="ctr"/>
+            <a:endParaRPr lang="en-US" dirty="0"/>
+          </a:p>
+        </p:txBody>
+      </p:sp>
+      <p:sp>
+        <p:nvSpPr>
+          <p:cNvPr id="6" name="Oval 5">
+            <a:extLst>
+              <a:ext uri="{FF2B5EF4-FFF2-40B4-BE49-F238E27FC236}">
+                <a16:creationId xmlns:a16="http://schemas.microsoft.com/office/drawing/2014/main" id="{670EB354-E8F6-431D-B7A2-306439F55760}"/>
+              </a:ext>
+            </a:extLst>
+          </p:cNvPr>
+          <p:cNvSpPr/>
+          <p:nvPr/>
+        </p:nvSpPr>
+        <p:spPr>
+          <a:xfrm>
+            <a:off x="4487732" y="894678"/>
+            <a:ext cx="683111" cy="155985"/>
+          </a:xfrm>
+          <a:prstGeom prst="ellipse">
+            <a:avLst/>
+          </a:prstGeom>
+          <a:noFill/>
+          <a:ln w="28575">
+            <a:solidFill>
+              <a:srgbClr val="FF0000"/>
+            </a:solidFill>
+          </a:ln>
+        </p:spPr>
+        <p:style>
+          <a:lnRef idx="2">
+            <a:schemeClr val="accent1">
+              <a:shade val="50000"/>
+            </a:schemeClr>
+          </a:lnRef>
+          <a:fillRef idx="1">
+            <a:schemeClr val="accent1"/>
+          </a:fillRef>
+          <a:effectRef idx="0">
+            <a:schemeClr val="accent1"/>
+          </a:effectRef>
+          <a:fontRef idx="minor">
+            <a:schemeClr val="lt1"/>
+          </a:fontRef>
+        </p:style>
+        <p:txBody>
+          <a:bodyPr rtlCol="0" anchor="ctr"/>
+          <a:lstStyle/>
+          <a:p>
+            <a:pPr algn="ctr"/>
+            <a:endParaRPr lang="en-US" dirty="0"/>
+          </a:p>
+        </p:txBody>
+      </p:sp>
+      <p:sp>
+        <p:nvSpPr>
+          <p:cNvPr id="7" name="Oval 6">
+            <a:extLst>
+              <a:ext uri="{FF2B5EF4-FFF2-40B4-BE49-F238E27FC236}">
+                <a16:creationId xmlns:a16="http://schemas.microsoft.com/office/drawing/2014/main" id="{4EAEFFE8-4E39-45D3-983D-6A92F9558521}"/>
+              </a:ext>
+            </a:extLst>
+          </p:cNvPr>
+          <p:cNvSpPr/>
+          <p:nvPr/>
+        </p:nvSpPr>
+        <p:spPr>
+          <a:xfrm>
+            <a:off x="405689" y="1034526"/>
+            <a:ext cx="390376" cy="363389"/>
+          </a:xfrm>
+          <a:prstGeom prst="ellipse">
+            <a:avLst/>
+          </a:prstGeom>
+          <a:noFill/>
+          <a:ln w="28575">
+            <a:solidFill>
+              <a:srgbClr val="FF0000"/>
+            </a:solidFill>
+          </a:ln>
+        </p:spPr>
+        <p:style>
+          <a:lnRef idx="2">
+            <a:schemeClr val="accent1">
+              <a:shade val="50000"/>
+            </a:schemeClr>
+          </a:lnRef>
+          <a:fillRef idx="1">
+            <a:schemeClr val="accent1"/>
+          </a:fillRef>
+          <a:effectRef idx="0">
+            <a:schemeClr val="accent1"/>
+          </a:effectRef>
+          <a:fontRef idx="minor">
+            <a:schemeClr val="lt1"/>
+          </a:fontRef>
+        </p:style>
+        <p:txBody>
+          <a:bodyPr rtlCol="0" anchor="ctr"/>
+          <a:lstStyle/>
+          <a:p>
+            <a:pPr algn="ctr"/>
+            <a:endParaRPr lang="en-US" dirty="0"/>
+          </a:p>
+        </p:txBody>
+      </p:sp>
+      <p:sp>
+        <p:nvSpPr>
+          <p:cNvPr id="8" name="TextBox 7">
+            <a:extLst>
+              <a:ext uri="{FF2B5EF4-FFF2-40B4-BE49-F238E27FC236}">
+                <a16:creationId xmlns:a16="http://schemas.microsoft.com/office/drawing/2014/main" id="{37943F2D-4774-4B9D-BA5E-612EFD807033}"/>
+              </a:ext>
+            </a:extLst>
+          </p:cNvPr>
+          <p:cNvSpPr txBox="1"/>
+          <p:nvPr/>
+        </p:nvSpPr>
+        <p:spPr>
+          <a:xfrm>
+            <a:off x="75059" y="5089270"/>
+            <a:ext cx="1152533" cy="369332"/>
+          </a:xfrm>
+          <a:prstGeom prst="rect">
+            <a:avLst/>
+          </a:prstGeom>
+          <a:noFill/>
+        </p:spPr>
+        <p:txBody>
+          <a:bodyPr wrap="square" rtlCol="0">
+            <a:spAutoFit/>
+          </a:bodyPr>
+          <a:lstStyle/>
+          <a:p>
+            <a:pPr algn="ctr"/>
             <a:r>
               <a:rPr lang="en-US" dirty="0"/>
               <a:t>1</a:t>
@@ -4028,10 +5798,1738 @@
           </a:p>
         </p:txBody>
       </p:sp>
+      <p:sp>
+        <p:nvSpPr>
+          <p:cNvPr id="9" name="TextBox 8">
+            <a:extLst>
+              <a:ext uri="{FF2B5EF4-FFF2-40B4-BE49-F238E27FC236}">
+                <a16:creationId xmlns:a16="http://schemas.microsoft.com/office/drawing/2014/main" id="{97C0F3BD-33FB-47EF-9305-F6389012EE1D}"/>
+              </a:ext>
+            </a:extLst>
+          </p:cNvPr>
+          <p:cNvSpPr txBox="1"/>
+          <p:nvPr/>
+        </p:nvSpPr>
+        <p:spPr>
+          <a:xfrm>
+            <a:off x="4207788" y="510677"/>
+            <a:ext cx="1152533" cy="369332"/>
+          </a:xfrm>
+          <a:prstGeom prst="rect">
+            <a:avLst/>
+          </a:prstGeom>
+          <a:noFill/>
+        </p:spPr>
+        <p:txBody>
+          <a:bodyPr wrap="square" rtlCol="0">
+            <a:spAutoFit/>
+          </a:bodyPr>
+          <a:lstStyle/>
+          <a:p>
+            <a:pPr algn="ctr"/>
+            <a:r>
+              <a:rPr lang="en-US" dirty="0"/>
+              <a:t>2</a:t>
+            </a:r>
+          </a:p>
+        </p:txBody>
+      </p:sp>
+      <p:sp>
+        <p:nvSpPr>
+          <p:cNvPr id="10" name="TextBox 9">
+            <a:extLst>
+              <a:ext uri="{FF2B5EF4-FFF2-40B4-BE49-F238E27FC236}">
+                <a16:creationId xmlns:a16="http://schemas.microsoft.com/office/drawing/2014/main" id="{CC499A06-0D56-4224-8016-95CBC1C47B08}"/>
+              </a:ext>
+            </a:extLst>
+          </p:cNvPr>
+          <p:cNvSpPr txBox="1"/>
+          <p:nvPr/>
+        </p:nvSpPr>
+        <p:spPr>
+          <a:xfrm>
+            <a:off x="-297917" y="1120023"/>
+            <a:ext cx="1152533" cy="369332"/>
+          </a:xfrm>
+          <a:prstGeom prst="rect">
+            <a:avLst/>
+          </a:prstGeom>
+          <a:noFill/>
+        </p:spPr>
+        <p:txBody>
+          <a:bodyPr wrap="square" rtlCol="0">
+            <a:spAutoFit/>
+          </a:bodyPr>
+          <a:lstStyle/>
+          <a:p>
+            <a:pPr algn="ctr"/>
+            <a:r>
+              <a:rPr lang="en-US" dirty="0"/>
+              <a:t>3</a:t>
+            </a:r>
+          </a:p>
+        </p:txBody>
+      </p:sp>
+      <p:pic>
+        <p:nvPicPr>
+          <p:cNvPr id="12" name="Picture 11">
+            <a:extLst>
+              <a:ext uri="{FF2B5EF4-FFF2-40B4-BE49-F238E27FC236}">
+                <a16:creationId xmlns:a16="http://schemas.microsoft.com/office/drawing/2014/main" id="{4040A769-8442-405A-9F89-C96343948E0A}"/>
+              </a:ext>
+            </a:extLst>
+          </p:cNvPr>
+          <p:cNvPicPr>
+            <a:picLocks noChangeAspect="1"/>
+          </p:cNvPicPr>
+          <p:nvPr/>
+        </p:nvPicPr>
+        <p:blipFill>
+          <a:blip r:embed="rId3"/>
+          <a:stretch>
+            <a:fillRect/>
+          </a:stretch>
+        </p:blipFill>
+        <p:spPr>
+          <a:xfrm>
+            <a:off x="6013811" y="2369059"/>
+            <a:ext cx="1452573" cy="1366847"/>
+          </a:xfrm>
+          <a:prstGeom prst="rect">
+            <a:avLst/>
+          </a:prstGeom>
+        </p:spPr>
+      </p:pic>
+      <p:cxnSp>
+        <p:nvCxnSpPr>
+          <p:cNvPr id="13" name="Straight Arrow Connector 12">
+            <a:extLst>
+              <a:ext uri="{FF2B5EF4-FFF2-40B4-BE49-F238E27FC236}">
+                <a16:creationId xmlns:a16="http://schemas.microsoft.com/office/drawing/2014/main" id="{84F1CC3D-AB9D-4EEF-A600-92154EEBB5F0}"/>
+              </a:ext>
+            </a:extLst>
+          </p:cNvPr>
+          <p:cNvCxnSpPr/>
+          <p:nvPr/>
+        </p:nvCxnSpPr>
+        <p:spPr>
+          <a:xfrm>
+            <a:off x="5527754" y="3005791"/>
+            <a:ext cx="340822" cy="0"/>
+          </a:xfrm>
+          <a:prstGeom prst="straightConnector1">
+            <a:avLst/>
+          </a:prstGeom>
+          <a:ln w="28575">
+            <a:solidFill>
+              <a:srgbClr val="FF0000"/>
+            </a:solidFill>
+            <a:tailEnd type="triangle"/>
+          </a:ln>
+        </p:spPr>
+        <p:style>
+          <a:lnRef idx="1">
+            <a:schemeClr val="accent1"/>
+          </a:lnRef>
+          <a:fillRef idx="0">
+            <a:schemeClr val="accent1"/>
+          </a:fillRef>
+          <a:effectRef idx="0">
+            <a:schemeClr val="accent1"/>
+          </a:effectRef>
+          <a:fontRef idx="minor">
+            <a:schemeClr val="tx1"/>
+          </a:fontRef>
+        </p:style>
+      </p:cxnSp>
+      <p:sp>
+        <p:nvSpPr>
+          <p:cNvPr id="15" name="Oval 14">
+            <a:extLst>
+              <a:ext uri="{FF2B5EF4-FFF2-40B4-BE49-F238E27FC236}">
+                <a16:creationId xmlns:a16="http://schemas.microsoft.com/office/drawing/2014/main" id="{A7C1EC57-604D-4F50-8892-0C9BF0A4D08E}"/>
+              </a:ext>
+            </a:extLst>
+          </p:cNvPr>
+          <p:cNvSpPr/>
+          <p:nvPr/>
+        </p:nvSpPr>
+        <p:spPr>
+          <a:xfrm>
+            <a:off x="6632090" y="2603351"/>
+            <a:ext cx="909022" cy="319144"/>
+          </a:xfrm>
+          <a:prstGeom prst="ellipse">
+            <a:avLst/>
+          </a:prstGeom>
+          <a:noFill/>
+          <a:ln w="28575">
+            <a:solidFill>
+              <a:srgbClr val="FF0000"/>
+            </a:solidFill>
+          </a:ln>
+        </p:spPr>
+        <p:style>
+          <a:lnRef idx="2">
+            <a:schemeClr val="accent1">
+              <a:shade val="50000"/>
+            </a:schemeClr>
+          </a:lnRef>
+          <a:fillRef idx="1">
+            <a:schemeClr val="accent1"/>
+          </a:fillRef>
+          <a:effectRef idx="0">
+            <a:schemeClr val="accent1"/>
+          </a:effectRef>
+          <a:fontRef idx="minor">
+            <a:schemeClr val="lt1"/>
+          </a:fontRef>
+        </p:style>
+        <p:txBody>
+          <a:bodyPr rtlCol="0" anchor="ctr"/>
+          <a:lstStyle/>
+          <a:p>
+            <a:pPr algn="ctr"/>
+            <a:endParaRPr lang="en-US" dirty="0"/>
+          </a:p>
+        </p:txBody>
+      </p:sp>
+      <p:sp>
+        <p:nvSpPr>
+          <p:cNvPr id="16" name="TextBox 15">
+            <a:extLst>
+              <a:ext uri="{FF2B5EF4-FFF2-40B4-BE49-F238E27FC236}">
+                <a16:creationId xmlns:a16="http://schemas.microsoft.com/office/drawing/2014/main" id="{1A466F4E-3426-477E-8EF3-D7D3117A01ED}"/>
+              </a:ext>
+            </a:extLst>
+          </p:cNvPr>
+          <p:cNvSpPr txBox="1"/>
+          <p:nvPr/>
+        </p:nvSpPr>
+        <p:spPr>
+          <a:xfrm>
+            <a:off x="7126653" y="2578257"/>
+            <a:ext cx="1152533" cy="369332"/>
+          </a:xfrm>
+          <a:prstGeom prst="rect">
+            <a:avLst/>
+          </a:prstGeom>
+          <a:noFill/>
+        </p:spPr>
+        <p:txBody>
+          <a:bodyPr wrap="square" rtlCol="0">
+            <a:spAutoFit/>
+          </a:bodyPr>
+          <a:lstStyle/>
+          <a:p>
+            <a:pPr algn="ctr"/>
+            <a:r>
+              <a:rPr lang="en-US" dirty="0"/>
+              <a:t>4</a:t>
+            </a:r>
+          </a:p>
+        </p:txBody>
+      </p:sp>
     </p:spTree>
     <p:extLst>
       <p:ext uri="{BB962C8B-B14F-4D97-AF65-F5344CB8AC3E}">
-        <p14:creationId xmlns:p14="http://schemas.microsoft.com/office/powerpoint/2010/main" val="2066687573"/>
+        <p14:creationId xmlns:p14="http://schemas.microsoft.com/office/powerpoint/2010/main" val="288990082"/>
+      </p:ext>
+    </p:extLst>
+  </p:cSld>
+  <p:clrMapOvr>
+    <a:masterClrMapping/>
+  </p:clrMapOvr>
+</p:sld>
+</file>
+
+<file path=ppt/slides/slide16.xml><?xml version="1.0" encoding="utf-8"?>
+<p:sld xmlns:a="http://schemas.openxmlformats.org/drawingml/2006/main" xmlns:r="http://schemas.openxmlformats.org/officeDocument/2006/relationships" xmlns:p="http://schemas.openxmlformats.org/presentationml/2006/main">
+  <p:cSld>
+    <p:spTree>
+      <p:nvGrpSpPr>
+        <p:cNvPr id="1" name=""/>
+        <p:cNvGrpSpPr/>
+        <p:nvPr/>
+      </p:nvGrpSpPr>
+      <p:grpSpPr>
+        <a:xfrm>
+          <a:off x="0" y="0"/>
+          <a:ext cx="0" cy="0"/>
+          <a:chOff x="0" y="0"/>
+          <a:chExt cx="0" cy="0"/>
+        </a:xfrm>
+      </p:grpSpPr>
+      <p:pic>
+        <p:nvPicPr>
+          <p:cNvPr id="2" name="Picture 1">
+            <a:extLst>
+              <a:ext uri="{FF2B5EF4-FFF2-40B4-BE49-F238E27FC236}">
+                <a16:creationId xmlns:a16="http://schemas.microsoft.com/office/drawing/2014/main" id="{B5299852-43FE-46F5-8030-C9FC7DD86C74}"/>
+              </a:ext>
+            </a:extLst>
+          </p:cNvPr>
+          <p:cNvPicPr>
+            <a:picLocks noChangeAspect="1"/>
+          </p:cNvPicPr>
+          <p:nvPr/>
+        </p:nvPicPr>
+        <p:blipFill>
+          <a:blip r:embed="rId2"/>
+          <a:stretch>
+            <a:fillRect/>
+          </a:stretch>
+        </p:blipFill>
+        <p:spPr>
+          <a:xfrm>
+            <a:off x="443342" y="766800"/>
+            <a:ext cx="4829210" cy="4743485"/>
+          </a:xfrm>
+          <a:prstGeom prst="rect">
+            <a:avLst/>
+          </a:prstGeom>
+        </p:spPr>
+      </p:pic>
+      <p:sp>
+        <p:nvSpPr>
+          <p:cNvPr id="3" name="Oval 2">
+            <a:extLst>
+              <a:ext uri="{FF2B5EF4-FFF2-40B4-BE49-F238E27FC236}">
+                <a16:creationId xmlns:a16="http://schemas.microsoft.com/office/drawing/2014/main" id="{A0EE4004-F4F7-4FA6-A29C-66684C4F0620}"/>
+              </a:ext>
+            </a:extLst>
+          </p:cNvPr>
+          <p:cNvSpPr/>
+          <p:nvPr/>
+        </p:nvSpPr>
+        <p:spPr>
+          <a:xfrm>
+            <a:off x="723039" y="1034526"/>
+            <a:ext cx="390376" cy="363389"/>
+          </a:xfrm>
+          <a:prstGeom prst="ellipse">
+            <a:avLst/>
+          </a:prstGeom>
+          <a:noFill/>
+          <a:ln w="28575">
+            <a:solidFill>
+              <a:srgbClr val="FF0000"/>
+            </a:solidFill>
+          </a:ln>
+        </p:spPr>
+        <p:style>
+          <a:lnRef idx="2">
+            <a:schemeClr val="accent1">
+              <a:shade val="50000"/>
+            </a:schemeClr>
+          </a:lnRef>
+          <a:fillRef idx="1">
+            <a:schemeClr val="accent1"/>
+          </a:fillRef>
+          <a:effectRef idx="0">
+            <a:schemeClr val="accent1"/>
+          </a:effectRef>
+          <a:fontRef idx="minor">
+            <a:schemeClr val="lt1"/>
+          </a:fontRef>
+        </p:style>
+        <p:txBody>
+          <a:bodyPr rtlCol="0" anchor="ctr"/>
+          <a:lstStyle/>
+          <a:p>
+            <a:pPr algn="ctr"/>
+            <a:endParaRPr lang="en-US" dirty="0"/>
+          </a:p>
+        </p:txBody>
+      </p:sp>
+      <p:sp>
+        <p:nvSpPr>
+          <p:cNvPr id="4" name="TextBox 3">
+            <a:extLst>
+              <a:ext uri="{FF2B5EF4-FFF2-40B4-BE49-F238E27FC236}">
+                <a16:creationId xmlns:a16="http://schemas.microsoft.com/office/drawing/2014/main" id="{162E6AA5-2AE3-45D0-A230-0FBA94C6B350}"/>
+              </a:ext>
+            </a:extLst>
+          </p:cNvPr>
+          <p:cNvSpPr txBox="1"/>
+          <p:nvPr/>
+        </p:nvSpPr>
+        <p:spPr>
+          <a:xfrm>
+            <a:off x="58879" y="1216220"/>
+            <a:ext cx="1152533" cy="369332"/>
+          </a:xfrm>
+          <a:prstGeom prst="rect">
+            <a:avLst/>
+          </a:prstGeom>
+          <a:noFill/>
+        </p:spPr>
+        <p:txBody>
+          <a:bodyPr wrap="square" rtlCol="0">
+            <a:spAutoFit/>
+          </a:bodyPr>
+          <a:lstStyle/>
+          <a:p>
+            <a:pPr algn="ctr"/>
+            <a:r>
+              <a:rPr lang="en-US" dirty="0"/>
+              <a:t>5</a:t>
+            </a:r>
+          </a:p>
+        </p:txBody>
+      </p:sp>
+      <p:cxnSp>
+        <p:nvCxnSpPr>
+          <p:cNvPr id="5" name="Straight Arrow Connector 4">
+            <a:extLst>
+              <a:ext uri="{FF2B5EF4-FFF2-40B4-BE49-F238E27FC236}">
+                <a16:creationId xmlns:a16="http://schemas.microsoft.com/office/drawing/2014/main" id="{8AE18938-788E-446F-9694-61124629B248}"/>
+              </a:ext>
+            </a:extLst>
+          </p:cNvPr>
+          <p:cNvCxnSpPr/>
+          <p:nvPr/>
+        </p:nvCxnSpPr>
+        <p:spPr>
+          <a:xfrm>
+            <a:off x="5527754" y="3005791"/>
+            <a:ext cx="340822" cy="0"/>
+          </a:xfrm>
+          <a:prstGeom prst="straightConnector1">
+            <a:avLst/>
+          </a:prstGeom>
+          <a:ln w="28575">
+            <a:solidFill>
+              <a:srgbClr val="FF0000"/>
+            </a:solidFill>
+            <a:tailEnd type="triangle"/>
+          </a:ln>
+        </p:spPr>
+        <p:style>
+          <a:lnRef idx="1">
+            <a:schemeClr val="accent1"/>
+          </a:lnRef>
+          <a:fillRef idx="0">
+            <a:schemeClr val="accent1"/>
+          </a:fillRef>
+          <a:effectRef idx="0">
+            <a:schemeClr val="accent1"/>
+          </a:effectRef>
+          <a:fontRef idx="minor">
+            <a:schemeClr val="tx1"/>
+          </a:fontRef>
+        </p:style>
+      </p:cxnSp>
+      <p:pic>
+        <p:nvPicPr>
+          <p:cNvPr id="7" name="Picture 6">
+            <a:extLst>
+              <a:ext uri="{FF2B5EF4-FFF2-40B4-BE49-F238E27FC236}">
+                <a16:creationId xmlns:a16="http://schemas.microsoft.com/office/drawing/2014/main" id="{25A5274E-C0E1-4829-8B82-A6D42E73BB8A}"/>
+              </a:ext>
+            </a:extLst>
+          </p:cNvPr>
+          <p:cNvPicPr>
+            <a:picLocks noChangeAspect="1"/>
+          </p:cNvPicPr>
+          <p:nvPr/>
+        </p:nvPicPr>
+        <p:blipFill>
+          <a:blip r:embed="rId3"/>
+          <a:stretch>
+            <a:fillRect/>
+          </a:stretch>
+        </p:blipFill>
+        <p:spPr>
+          <a:xfrm>
+            <a:off x="6044447" y="2066971"/>
+            <a:ext cx="1447811" cy="2143141"/>
+          </a:xfrm>
+          <a:prstGeom prst="rect">
+            <a:avLst/>
+          </a:prstGeom>
+        </p:spPr>
+      </p:pic>
+      <p:sp>
+        <p:nvSpPr>
+          <p:cNvPr id="8" name="Oval 7">
+            <a:extLst>
+              <a:ext uri="{FF2B5EF4-FFF2-40B4-BE49-F238E27FC236}">
+                <a16:creationId xmlns:a16="http://schemas.microsoft.com/office/drawing/2014/main" id="{A2754597-E5FF-4FE4-884B-9395DF27D251}"/>
+              </a:ext>
+            </a:extLst>
+          </p:cNvPr>
+          <p:cNvSpPr/>
+          <p:nvPr/>
+        </p:nvSpPr>
+        <p:spPr>
+          <a:xfrm>
+            <a:off x="6035482" y="2176629"/>
+            <a:ext cx="205705" cy="233083"/>
+          </a:xfrm>
+          <a:prstGeom prst="ellipse">
+            <a:avLst/>
+          </a:prstGeom>
+          <a:noFill/>
+          <a:ln w="28575">
+            <a:solidFill>
+              <a:srgbClr val="FF0000"/>
+            </a:solidFill>
+          </a:ln>
+        </p:spPr>
+        <p:style>
+          <a:lnRef idx="2">
+            <a:schemeClr val="accent1">
+              <a:shade val="50000"/>
+            </a:schemeClr>
+          </a:lnRef>
+          <a:fillRef idx="1">
+            <a:schemeClr val="accent1"/>
+          </a:fillRef>
+          <a:effectRef idx="0">
+            <a:schemeClr val="accent1"/>
+          </a:effectRef>
+          <a:fontRef idx="minor">
+            <a:schemeClr val="lt1"/>
+          </a:fontRef>
+        </p:style>
+        <p:txBody>
+          <a:bodyPr rtlCol="0" anchor="ctr"/>
+          <a:lstStyle/>
+          <a:p>
+            <a:pPr algn="ctr"/>
+            <a:endParaRPr lang="en-US" dirty="0"/>
+          </a:p>
+        </p:txBody>
+      </p:sp>
+      <p:sp>
+        <p:nvSpPr>
+          <p:cNvPr id="9" name="Oval 8">
+            <a:extLst>
+              <a:ext uri="{FF2B5EF4-FFF2-40B4-BE49-F238E27FC236}">
+                <a16:creationId xmlns:a16="http://schemas.microsoft.com/office/drawing/2014/main" id="{1ACEAAA3-5E71-4B77-9AFF-B18E1B37692D}"/>
+              </a:ext>
+            </a:extLst>
+          </p:cNvPr>
+          <p:cNvSpPr/>
+          <p:nvPr/>
+        </p:nvSpPr>
+        <p:spPr>
+          <a:xfrm>
+            <a:off x="6680499" y="2409712"/>
+            <a:ext cx="919779" cy="446443"/>
+          </a:xfrm>
+          <a:prstGeom prst="ellipse">
+            <a:avLst/>
+          </a:prstGeom>
+          <a:noFill/>
+          <a:ln w="28575">
+            <a:solidFill>
+              <a:srgbClr val="FF0000"/>
+            </a:solidFill>
+          </a:ln>
+        </p:spPr>
+        <p:style>
+          <a:lnRef idx="2">
+            <a:schemeClr val="accent1">
+              <a:shade val="50000"/>
+            </a:schemeClr>
+          </a:lnRef>
+          <a:fillRef idx="1">
+            <a:schemeClr val="accent1"/>
+          </a:fillRef>
+          <a:effectRef idx="0">
+            <a:schemeClr val="accent1"/>
+          </a:effectRef>
+          <a:fontRef idx="minor">
+            <a:schemeClr val="lt1"/>
+          </a:fontRef>
+        </p:style>
+        <p:txBody>
+          <a:bodyPr rtlCol="0" anchor="ctr"/>
+          <a:lstStyle/>
+          <a:p>
+            <a:pPr algn="ctr"/>
+            <a:endParaRPr lang="en-US" dirty="0"/>
+          </a:p>
+        </p:txBody>
+      </p:sp>
+      <p:sp>
+        <p:nvSpPr>
+          <p:cNvPr id="10" name="TextBox 9">
+            <a:extLst>
+              <a:ext uri="{FF2B5EF4-FFF2-40B4-BE49-F238E27FC236}">
+                <a16:creationId xmlns:a16="http://schemas.microsoft.com/office/drawing/2014/main" id="{82A4D057-2165-4CDD-8070-50ADA5A2CA56}"/>
+              </a:ext>
+            </a:extLst>
+          </p:cNvPr>
+          <p:cNvSpPr txBox="1"/>
+          <p:nvPr/>
+        </p:nvSpPr>
+        <p:spPr>
+          <a:xfrm>
+            <a:off x="5332337" y="2108504"/>
+            <a:ext cx="1152533" cy="369332"/>
+          </a:xfrm>
+          <a:prstGeom prst="rect">
+            <a:avLst/>
+          </a:prstGeom>
+          <a:noFill/>
+        </p:spPr>
+        <p:txBody>
+          <a:bodyPr wrap="square" rtlCol="0">
+            <a:spAutoFit/>
+          </a:bodyPr>
+          <a:lstStyle/>
+          <a:p>
+            <a:pPr algn="ctr"/>
+            <a:r>
+              <a:rPr lang="en-US" dirty="0"/>
+              <a:t>6</a:t>
+            </a:r>
+          </a:p>
+        </p:txBody>
+      </p:sp>
+      <p:sp>
+        <p:nvSpPr>
+          <p:cNvPr id="11" name="TextBox 10">
+            <a:extLst>
+              <a:ext uri="{FF2B5EF4-FFF2-40B4-BE49-F238E27FC236}">
+                <a16:creationId xmlns:a16="http://schemas.microsoft.com/office/drawing/2014/main" id="{ECF28977-01D7-4D51-A075-F269EE040BD8}"/>
+              </a:ext>
+            </a:extLst>
+          </p:cNvPr>
+          <p:cNvSpPr txBox="1"/>
+          <p:nvPr/>
+        </p:nvSpPr>
+        <p:spPr>
+          <a:xfrm>
+            <a:off x="7219640" y="2448267"/>
+            <a:ext cx="1152533" cy="369332"/>
+          </a:xfrm>
+          <a:prstGeom prst="rect">
+            <a:avLst/>
+          </a:prstGeom>
+          <a:noFill/>
+        </p:spPr>
+        <p:txBody>
+          <a:bodyPr wrap="square" rtlCol="0">
+            <a:spAutoFit/>
+          </a:bodyPr>
+          <a:lstStyle/>
+          <a:p>
+            <a:pPr algn="ctr"/>
+            <a:r>
+              <a:rPr lang="en-US" dirty="0"/>
+              <a:t>7</a:t>
+            </a:r>
+          </a:p>
+        </p:txBody>
+      </p:sp>
+    </p:spTree>
+    <p:extLst>
+      <p:ext uri="{BB962C8B-B14F-4D97-AF65-F5344CB8AC3E}">
+        <p14:creationId xmlns:p14="http://schemas.microsoft.com/office/powerpoint/2010/main" val="1345282910"/>
+      </p:ext>
+    </p:extLst>
+  </p:cSld>
+  <p:clrMapOvr>
+    <a:masterClrMapping/>
+  </p:clrMapOvr>
+</p:sld>
+</file>
+
+<file path=ppt/slides/slide17.xml><?xml version="1.0" encoding="utf-8"?>
+<p:sld xmlns:a="http://schemas.openxmlformats.org/drawingml/2006/main" xmlns:r="http://schemas.openxmlformats.org/officeDocument/2006/relationships" xmlns:p="http://schemas.openxmlformats.org/presentationml/2006/main">
+  <p:cSld>
+    <p:spTree>
+      <p:nvGrpSpPr>
+        <p:cNvPr id="1" name=""/>
+        <p:cNvGrpSpPr/>
+        <p:nvPr/>
+      </p:nvGrpSpPr>
+      <p:grpSpPr>
+        <a:xfrm>
+          <a:off x="0" y="0"/>
+          <a:ext cx="0" cy="0"/>
+          <a:chOff x="0" y="0"/>
+          <a:chExt cx="0" cy="0"/>
+        </a:xfrm>
+      </p:grpSpPr>
+      <p:pic>
+        <p:nvPicPr>
+          <p:cNvPr id="2" name="Picture 1">
+            <a:extLst>
+              <a:ext uri="{FF2B5EF4-FFF2-40B4-BE49-F238E27FC236}">
+                <a16:creationId xmlns:a16="http://schemas.microsoft.com/office/drawing/2014/main" id="{8F361E55-22EF-4BED-9C8A-C967B5610CC8}"/>
+              </a:ext>
+            </a:extLst>
+          </p:cNvPr>
+          <p:cNvPicPr>
+            <a:picLocks noChangeAspect="1"/>
+          </p:cNvPicPr>
+          <p:nvPr/>
+        </p:nvPicPr>
+        <p:blipFill>
+          <a:blip r:embed="rId2"/>
+          <a:stretch>
+            <a:fillRect/>
+          </a:stretch>
+        </p:blipFill>
+        <p:spPr>
+          <a:xfrm>
+            <a:off x="443342" y="766800"/>
+            <a:ext cx="4829210" cy="4743485"/>
+          </a:xfrm>
+          <a:prstGeom prst="rect">
+            <a:avLst/>
+          </a:prstGeom>
+        </p:spPr>
+      </p:pic>
+      <p:pic>
+        <p:nvPicPr>
+          <p:cNvPr id="4" name="Picture 3">
+            <a:extLst>
+              <a:ext uri="{FF2B5EF4-FFF2-40B4-BE49-F238E27FC236}">
+                <a16:creationId xmlns:a16="http://schemas.microsoft.com/office/drawing/2014/main" id="{51CCF26D-84A8-404D-B18F-D7879BE679C4}"/>
+              </a:ext>
+            </a:extLst>
+          </p:cNvPr>
+          <p:cNvPicPr>
+            <a:picLocks noChangeAspect="1"/>
+          </p:cNvPicPr>
+          <p:nvPr/>
+        </p:nvPicPr>
+        <p:blipFill>
+          <a:blip r:embed="rId3"/>
+          <a:stretch>
+            <a:fillRect/>
+          </a:stretch>
+        </p:blipFill>
+        <p:spPr>
+          <a:xfrm>
+            <a:off x="6024164" y="2495600"/>
+            <a:ext cx="1466861" cy="1285884"/>
+          </a:xfrm>
+          <a:prstGeom prst="rect">
+            <a:avLst/>
+          </a:prstGeom>
+        </p:spPr>
+      </p:pic>
+      <p:cxnSp>
+        <p:nvCxnSpPr>
+          <p:cNvPr id="5" name="Straight Arrow Connector 4">
+            <a:extLst>
+              <a:ext uri="{FF2B5EF4-FFF2-40B4-BE49-F238E27FC236}">
+                <a16:creationId xmlns:a16="http://schemas.microsoft.com/office/drawing/2014/main" id="{C5CF4DB3-1976-4612-8024-17775FCE6B31}"/>
+              </a:ext>
+            </a:extLst>
+          </p:cNvPr>
+          <p:cNvCxnSpPr/>
+          <p:nvPr/>
+        </p:nvCxnSpPr>
+        <p:spPr>
+          <a:xfrm>
+            <a:off x="5527754" y="3005791"/>
+            <a:ext cx="340822" cy="0"/>
+          </a:xfrm>
+          <a:prstGeom prst="straightConnector1">
+            <a:avLst/>
+          </a:prstGeom>
+          <a:ln w="28575">
+            <a:solidFill>
+              <a:srgbClr val="FF0000"/>
+            </a:solidFill>
+            <a:tailEnd type="triangle"/>
+          </a:ln>
+        </p:spPr>
+        <p:style>
+          <a:lnRef idx="1">
+            <a:schemeClr val="accent1"/>
+          </a:lnRef>
+          <a:fillRef idx="0">
+            <a:schemeClr val="accent1"/>
+          </a:fillRef>
+          <a:effectRef idx="0">
+            <a:schemeClr val="accent1"/>
+          </a:effectRef>
+          <a:fontRef idx="minor">
+            <a:schemeClr val="tx1"/>
+          </a:fontRef>
+        </p:style>
+      </p:cxnSp>
+      <p:sp>
+        <p:nvSpPr>
+          <p:cNvPr id="6" name="Oval 5">
+            <a:extLst>
+              <a:ext uri="{FF2B5EF4-FFF2-40B4-BE49-F238E27FC236}">
+                <a16:creationId xmlns:a16="http://schemas.microsoft.com/office/drawing/2014/main" id="{4211DAF3-1611-4D93-B8CF-B0CD5E7D9D78}"/>
+              </a:ext>
+            </a:extLst>
+          </p:cNvPr>
+          <p:cNvSpPr/>
+          <p:nvPr/>
+        </p:nvSpPr>
+        <p:spPr>
+          <a:xfrm>
+            <a:off x="1008116" y="1066800"/>
+            <a:ext cx="390376" cy="363389"/>
+          </a:xfrm>
+          <a:prstGeom prst="ellipse">
+            <a:avLst/>
+          </a:prstGeom>
+          <a:noFill/>
+          <a:ln w="28575">
+            <a:solidFill>
+              <a:srgbClr val="FF0000"/>
+            </a:solidFill>
+          </a:ln>
+        </p:spPr>
+        <p:style>
+          <a:lnRef idx="2">
+            <a:schemeClr val="accent1">
+              <a:shade val="50000"/>
+            </a:schemeClr>
+          </a:lnRef>
+          <a:fillRef idx="1">
+            <a:schemeClr val="accent1"/>
+          </a:fillRef>
+          <a:effectRef idx="0">
+            <a:schemeClr val="accent1"/>
+          </a:effectRef>
+          <a:fontRef idx="minor">
+            <a:schemeClr val="lt1"/>
+          </a:fontRef>
+        </p:style>
+        <p:txBody>
+          <a:bodyPr rtlCol="0" anchor="ctr"/>
+          <a:lstStyle/>
+          <a:p>
+            <a:pPr algn="ctr"/>
+            <a:endParaRPr lang="en-US" dirty="0"/>
+          </a:p>
+        </p:txBody>
+      </p:sp>
+      <p:sp>
+        <p:nvSpPr>
+          <p:cNvPr id="7" name="TextBox 6">
+            <a:extLst>
+              <a:ext uri="{FF2B5EF4-FFF2-40B4-BE49-F238E27FC236}">
+                <a16:creationId xmlns:a16="http://schemas.microsoft.com/office/drawing/2014/main" id="{5C6B1BE0-E6A4-4849-B2A3-591B664D3254}"/>
+              </a:ext>
+            </a:extLst>
+          </p:cNvPr>
+          <p:cNvSpPr txBox="1"/>
+          <p:nvPr/>
+        </p:nvSpPr>
+        <p:spPr>
+          <a:xfrm>
+            <a:off x="343956" y="1248494"/>
+            <a:ext cx="1152533" cy="369332"/>
+          </a:xfrm>
+          <a:prstGeom prst="rect">
+            <a:avLst/>
+          </a:prstGeom>
+          <a:noFill/>
+        </p:spPr>
+        <p:txBody>
+          <a:bodyPr wrap="square" rtlCol="0">
+            <a:spAutoFit/>
+          </a:bodyPr>
+          <a:lstStyle/>
+          <a:p>
+            <a:pPr algn="ctr"/>
+            <a:r>
+              <a:rPr lang="en-US" dirty="0"/>
+              <a:t>8</a:t>
+            </a:r>
+          </a:p>
+        </p:txBody>
+      </p:sp>
+      <p:sp>
+        <p:nvSpPr>
+          <p:cNvPr id="8" name="Oval 7">
+            <a:extLst>
+              <a:ext uri="{FF2B5EF4-FFF2-40B4-BE49-F238E27FC236}">
+                <a16:creationId xmlns:a16="http://schemas.microsoft.com/office/drawing/2014/main" id="{6AE7FA99-9785-4C65-A094-0FBF12443F59}"/>
+              </a:ext>
+            </a:extLst>
+          </p:cNvPr>
+          <p:cNvSpPr/>
+          <p:nvPr/>
+        </p:nvSpPr>
+        <p:spPr>
+          <a:xfrm>
+            <a:off x="6620187" y="2709134"/>
+            <a:ext cx="910165" cy="512781"/>
+          </a:xfrm>
+          <a:prstGeom prst="ellipse">
+            <a:avLst/>
+          </a:prstGeom>
+          <a:noFill/>
+          <a:ln w="28575">
+            <a:solidFill>
+              <a:srgbClr val="FF0000"/>
+            </a:solidFill>
+          </a:ln>
+        </p:spPr>
+        <p:style>
+          <a:lnRef idx="2">
+            <a:schemeClr val="accent1">
+              <a:shade val="50000"/>
+            </a:schemeClr>
+          </a:lnRef>
+          <a:fillRef idx="1">
+            <a:schemeClr val="accent1"/>
+          </a:fillRef>
+          <a:effectRef idx="0">
+            <a:schemeClr val="accent1"/>
+          </a:effectRef>
+          <a:fontRef idx="minor">
+            <a:schemeClr val="lt1"/>
+          </a:fontRef>
+        </p:style>
+        <p:txBody>
+          <a:bodyPr rtlCol="0" anchor="ctr"/>
+          <a:lstStyle/>
+          <a:p>
+            <a:pPr algn="ctr"/>
+            <a:endParaRPr lang="en-US" dirty="0"/>
+          </a:p>
+        </p:txBody>
+      </p:sp>
+      <p:sp>
+        <p:nvSpPr>
+          <p:cNvPr id="9" name="Oval 8">
+            <a:extLst>
+              <a:ext uri="{FF2B5EF4-FFF2-40B4-BE49-F238E27FC236}">
+                <a16:creationId xmlns:a16="http://schemas.microsoft.com/office/drawing/2014/main" id="{F26010AC-DAA4-4645-A367-E208E5B70E3E}"/>
+              </a:ext>
+            </a:extLst>
+          </p:cNvPr>
+          <p:cNvSpPr/>
+          <p:nvPr/>
+        </p:nvSpPr>
+        <p:spPr>
+          <a:xfrm>
+            <a:off x="6024164" y="3351007"/>
+            <a:ext cx="173866" cy="155986"/>
+          </a:xfrm>
+          <a:prstGeom prst="ellipse">
+            <a:avLst/>
+          </a:prstGeom>
+          <a:noFill/>
+          <a:ln w="28575">
+            <a:solidFill>
+              <a:srgbClr val="FF0000"/>
+            </a:solidFill>
+          </a:ln>
+        </p:spPr>
+        <p:style>
+          <a:lnRef idx="2">
+            <a:schemeClr val="accent1">
+              <a:shade val="50000"/>
+            </a:schemeClr>
+          </a:lnRef>
+          <a:fillRef idx="1">
+            <a:schemeClr val="accent1"/>
+          </a:fillRef>
+          <a:effectRef idx="0">
+            <a:schemeClr val="accent1"/>
+          </a:effectRef>
+          <a:fontRef idx="minor">
+            <a:schemeClr val="lt1"/>
+          </a:fontRef>
+        </p:style>
+        <p:txBody>
+          <a:bodyPr rtlCol="0" anchor="ctr"/>
+          <a:lstStyle/>
+          <a:p>
+            <a:pPr algn="ctr"/>
+            <a:endParaRPr lang="en-US" dirty="0"/>
+          </a:p>
+        </p:txBody>
+      </p:sp>
+      <p:sp>
+        <p:nvSpPr>
+          <p:cNvPr id="10" name="TextBox 9">
+            <a:extLst>
+              <a:ext uri="{FF2B5EF4-FFF2-40B4-BE49-F238E27FC236}">
+                <a16:creationId xmlns:a16="http://schemas.microsoft.com/office/drawing/2014/main" id="{BA444467-8B23-40D4-9AD7-473C06851778}"/>
+              </a:ext>
+            </a:extLst>
+          </p:cNvPr>
+          <p:cNvSpPr txBox="1"/>
+          <p:nvPr/>
+        </p:nvSpPr>
+        <p:spPr>
+          <a:xfrm>
+            <a:off x="7090104" y="2769210"/>
+            <a:ext cx="1152533" cy="369332"/>
+          </a:xfrm>
+          <a:prstGeom prst="rect">
+            <a:avLst/>
+          </a:prstGeom>
+          <a:noFill/>
+        </p:spPr>
+        <p:txBody>
+          <a:bodyPr wrap="square" rtlCol="0">
+            <a:spAutoFit/>
+          </a:bodyPr>
+          <a:lstStyle/>
+          <a:p>
+            <a:pPr algn="ctr"/>
+            <a:r>
+              <a:rPr lang="en-US" dirty="0"/>
+              <a:t>9</a:t>
+            </a:r>
+          </a:p>
+        </p:txBody>
+      </p:sp>
+      <p:sp>
+        <p:nvSpPr>
+          <p:cNvPr id="11" name="TextBox 10">
+            <a:extLst>
+              <a:ext uri="{FF2B5EF4-FFF2-40B4-BE49-F238E27FC236}">
+                <a16:creationId xmlns:a16="http://schemas.microsoft.com/office/drawing/2014/main" id="{4AF9B472-7155-4F58-BBE0-E14AADF0BF29}"/>
+              </a:ext>
+            </a:extLst>
+          </p:cNvPr>
+          <p:cNvSpPr txBox="1"/>
+          <p:nvPr/>
+        </p:nvSpPr>
+        <p:spPr>
+          <a:xfrm>
+            <a:off x="5292309" y="3244334"/>
+            <a:ext cx="1152533" cy="369332"/>
+          </a:xfrm>
+          <a:prstGeom prst="rect">
+            <a:avLst/>
+          </a:prstGeom>
+          <a:noFill/>
+        </p:spPr>
+        <p:txBody>
+          <a:bodyPr wrap="square" rtlCol="0">
+            <a:spAutoFit/>
+          </a:bodyPr>
+          <a:lstStyle/>
+          <a:p>
+            <a:pPr algn="ctr"/>
+            <a:r>
+              <a:rPr lang="en-US" dirty="0"/>
+              <a:t>10</a:t>
+            </a:r>
+          </a:p>
+        </p:txBody>
+      </p:sp>
+    </p:spTree>
+    <p:extLst>
+      <p:ext uri="{BB962C8B-B14F-4D97-AF65-F5344CB8AC3E}">
+        <p14:creationId xmlns:p14="http://schemas.microsoft.com/office/powerpoint/2010/main" val="2721909957"/>
+      </p:ext>
+    </p:extLst>
+  </p:cSld>
+  <p:clrMapOvr>
+    <a:masterClrMapping/>
+  </p:clrMapOvr>
+</p:sld>
+</file>
+
+<file path=ppt/slides/slide18.xml><?xml version="1.0" encoding="utf-8"?>
+<p:sld xmlns:a="http://schemas.openxmlformats.org/drawingml/2006/main" xmlns:r="http://schemas.openxmlformats.org/officeDocument/2006/relationships" xmlns:p="http://schemas.openxmlformats.org/presentationml/2006/main">
+  <p:cSld>
+    <p:spTree>
+      <p:nvGrpSpPr>
+        <p:cNvPr id="1" name=""/>
+        <p:cNvGrpSpPr/>
+        <p:nvPr/>
+      </p:nvGrpSpPr>
+      <p:grpSpPr>
+        <a:xfrm>
+          <a:off x="0" y="0"/>
+          <a:ext cx="0" cy="0"/>
+          <a:chOff x="0" y="0"/>
+          <a:chExt cx="0" cy="0"/>
+        </a:xfrm>
+      </p:grpSpPr>
+      <p:pic>
+        <p:nvPicPr>
+          <p:cNvPr id="12" name="Picture 11">
+            <a:extLst>
+              <a:ext uri="{FF2B5EF4-FFF2-40B4-BE49-F238E27FC236}">
+                <a16:creationId xmlns:a16="http://schemas.microsoft.com/office/drawing/2014/main" id="{E73BC4C1-82B4-44ED-95CB-C408010F4AB4}"/>
+              </a:ext>
+            </a:extLst>
+          </p:cNvPr>
+          <p:cNvPicPr>
+            <a:picLocks noChangeAspect="1"/>
+          </p:cNvPicPr>
+          <p:nvPr/>
+        </p:nvPicPr>
+        <p:blipFill>
+          <a:blip r:embed="rId2"/>
+          <a:stretch>
+            <a:fillRect/>
+          </a:stretch>
+        </p:blipFill>
+        <p:spPr>
+          <a:xfrm>
+            <a:off x="6096000" y="2206101"/>
+            <a:ext cx="1466861" cy="2076465"/>
+          </a:xfrm>
+          <a:prstGeom prst="rect">
+            <a:avLst/>
+          </a:prstGeom>
+        </p:spPr>
+      </p:pic>
+      <p:pic>
+        <p:nvPicPr>
+          <p:cNvPr id="2" name="Picture 1">
+            <a:extLst>
+              <a:ext uri="{FF2B5EF4-FFF2-40B4-BE49-F238E27FC236}">
+                <a16:creationId xmlns:a16="http://schemas.microsoft.com/office/drawing/2014/main" id="{8F361E55-22EF-4BED-9C8A-C967B5610CC8}"/>
+              </a:ext>
+            </a:extLst>
+          </p:cNvPr>
+          <p:cNvPicPr>
+            <a:picLocks noChangeAspect="1"/>
+          </p:cNvPicPr>
+          <p:nvPr/>
+        </p:nvPicPr>
+        <p:blipFill>
+          <a:blip r:embed="rId3"/>
+          <a:stretch>
+            <a:fillRect/>
+          </a:stretch>
+        </p:blipFill>
+        <p:spPr>
+          <a:xfrm>
+            <a:off x="443342" y="766800"/>
+            <a:ext cx="4829210" cy="4743485"/>
+          </a:xfrm>
+          <a:prstGeom prst="rect">
+            <a:avLst/>
+          </a:prstGeom>
+        </p:spPr>
+      </p:pic>
+      <p:cxnSp>
+        <p:nvCxnSpPr>
+          <p:cNvPr id="5" name="Straight Arrow Connector 4">
+            <a:extLst>
+              <a:ext uri="{FF2B5EF4-FFF2-40B4-BE49-F238E27FC236}">
+                <a16:creationId xmlns:a16="http://schemas.microsoft.com/office/drawing/2014/main" id="{C5CF4DB3-1976-4612-8024-17775FCE6B31}"/>
+              </a:ext>
+            </a:extLst>
+          </p:cNvPr>
+          <p:cNvCxnSpPr/>
+          <p:nvPr/>
+        </p:nvCxnSpPr>
+        <p:spPr>
+          <a:xfrm>
+            <a:off x="5527754" y="3005791"/>
+            <a:ext cx="340822" cy="0"/>
+          </a:xfrm>
+          <a:prstGeom prst="straightConnector1">
+            <a:avLst/>
+          </a:prstGeom>
+          <a:ln w="28575">
+            <a:solidFill>
+              <a:srgbClr val="FF0000"/>
+            </a:solidFill>
+            <a:tailEnd type="triangle"/>
+          </a:ln>
+        </p:spPr>
+        <p:style>
+          <a:lnRef idx="1">
+            <a:schemeClr val="accent1"/>
+          </a:lnRef>
+          <a:fillRef idx="0">
+            <a:schemeClr val="accent1"/>
+          </a:fillRef>
+          <a:effectRef idx="0">
+            <a:schemeClr val="accent1"/>
+          </a:effectRef>
+          <a:fontRef idx="minor">
+            <a:schemeClr val="tx1"/>
+          </a:fontRef>
+        </p:style>
+      </p:cxnSp>
+      <p:sp>
+        <p:nvSpPr>
+          <p:cNvPr id="6" name="Oval 5">
+            <a:extLst>
+              <a:ext uri="{FF2B5EF4-FFF2-40B4-BE49-F238E27FC236}">
+                <a16:creationId xmlns:a16="http://schemas.microsoft.com/office/drawing/2014/main" id="{4211DAF3-1611-4D93-B8CF-B0CD5E7D9D78}"/>
+              </a:ext>
+            </a:extLst>
+          </p:cNvPr>
+          <p:cNvSpPr/>
+          <p:nvPr/>
+        </p:nvSpPr>
+        <p:spPr>
+          <a:xfrm>
+            <a:off x="1336223" y="1050663"/>
+            <a:ext cx="390376" cy="363389"/>
+          </a:xfrm>
+          <a:prstGeom prst="ellipse">
+            <a:avLst/>
+          </a:prstGeom>
+          <a:noFill/>
+          <a:ln w="28575">
+            <a:solidFill>
+              <a:srgbClr val="FF0000"/>
+            </a:solidFill>
+          </a:ln>
+        </p:spPr>
+        <p:style>
+          <a:lnRef idx="2">
+            <a:schemeClr val="accent1">
+              <a:shade val="50000"/>
+            </a:schemeClr>
+          </a:lnRef>
+          <a:fillRef idx="1">
+            <a:schemeClr val="accent1"/>
+          </a:fillRef>
+          <a:effectRef idx="0">
+            <a:schemeClr val="accent1"/>
+          </a:effectRef>
+          <a:fontRef idx="minor">
+            <a:schemeClr val="lt1"/>
+          </a:fontRef>
+        </p:style>
+        <p:txBody>
+          <a:bodyPr rtlCol="0" anchor="ctr"/>
+          <a:lstStyle/>
+          <a:p>
+            <a:pPr algn="ctr"/>
+            <a:endParaRPr lang="en-US" dirty="0"/>
+          </a:p>
+        </p:txBody>
+      </p:sp>
+      <p:sp>
+        <p:nvSpPr>
+          <p:cNvPr id="7" name="TextBox 6">
+            <a:extLst>
+              <a:ext uri="{FF2B5EF4-FFF2-40B4-BE49-F238E27FC236}">
+                <a16:creationId xmlns:a16="http://schemas.microsoft.com/office/drawing/2014/main" id="{5C6B1BE0-E6A4-4849-B2A3-591B664D3254}"/>
+              </a:ext>
+            </a:extLst>
+          </p:cNvPr>
+          <p:cNvSpPr txBox="1"/>
+          <p:nvPr/>
+        </p:nvSpPr>
+        <p:spPr>
+          <a:xfrm>
+            <a:off x="672063" y="1232357"/>
+            <a:ext cx="1152533" cy="369332"/>
+          </a:xfrm>
+          <a:prstGeom prst="rect">
+            <a:avLst/>
+          </a:prstGeom>
+          <a:noFill/>
+        </p:spPr>
+        <p:txBody>
+          <a:bodyPr wrap="square" rtlCol="0">
+            <a:spAutoFit/>
+          </a:bodyPr>
+          <a:lstStyle/>
+          <a:p>
+            <a:pPr algn="ctr"/>
+            <a:r>
+              <a:rPr lang="en-US" dirty="0"/>
+              <a:t>11</a:t>
+            </a:r>
+          </a:p>
+        </p:txBody>
+      </p:sp>
+      <p:sp>
+        <p:nvSpPr>
+          <p:cNvPr id="8" name="Oval 7">
+            <a:extLst>
+              <a:ext uri="{FF2B5EF4-FFF2-40B4-BE49-F238E27FC236}">
+                <a16:creationId xmlns:a16="http://schemas.microsoft.com/office/drawing/2014/main" id="{6AE7FA99-9785-4C65-A094-0FBF12443F59}"/>
+              </a:ext>
+            </a:extLst>
+          </p:cNvPr>
+          <p:cNvSpPr/>
+          <p:nvPr/>
+        </p:nvSpPr>
+        <p:spPr>
+          <a:xfrm>
+            <a:off x="6724532" y="2428545"/>
+            <a:ext cx="910165" cy="340665"/>
+          </a:xfrm>
+          <a:prstGeom prst="ellipse">
+            <a:avLst/>
+          </a:prstGeom>
+          <a:noFill/>
+          <a:ln w="28575">
+            <a:solidFill>
+              <a:srgbClr val="FF0000"/>
+            </a:solidFill>
+          </a:ln>
+        </p:spPr>
+        <p:style>
+          <a:lnRef idx="2">
+            <a:schemeClr val="accent1">
+              <a:shade val="50000"/>
+            </a:schemeClr>
+          </a:lnRef>
+          <a:fillRef idx="1">
+            <a:schemeClr val="accent1"/>
+          </a:fillRef>
+          <a:effectRef idx="0">
+            <a:schemeClr val="accent1"/>
+          </a:effectRef>
+          <a:fontRef idx="minor">
+            <a:schemeClr val="lt1"/>
+          </a:fontRef>
+        </p:style>
+        <p:txBody>
+          <a:bodyPr rtlCol="0" anchor="ctr"/>
+          <a:lstStyle/>
+          <a:p>
+            <a:pPr algn="ctr"/>
+            <a:endParaRPr lang="en-US" dirty="0"/>
+          </a:p>
+        </p:txBody>
+      </p:sp>
+      <p:sp>
+        <p:nvSpPr>
+          <p:cNvPr id="10" name="TextBox 9">
+            <a:extLst>
+              <a:ext uri="{FF2B5EF4-FFF2-40B4-BE49-F238E27FC236}">
+                <a16:creationId xmlns:a16="http://schemas.microsoft.com/office/drawing/2014/main" id="{BA444467-8B23-40D4-9AD7-473C06851778}"/>
+              </a:ext>
+            </a:extLst>
+          </p:cNvPr>
+          <p:cNvSpPr txBox="1"/>
+          <p:nvPr/>
+        </p:nvSpPr>
+        <p:spPr>
+          <a:xfrm>
+            <a:off x="7179614" y="2428545"/>
+            <a:ext cx="1152533" cy="369332"/>
+          </a:xfrm>
+          <a:prstGeom prst="rect">
+            <a:avLst/>
+          </a:prstGeom>
+          <a:noFill/>
+        </p:spPr>
+        <p:txBody>
+          <a:bodyPr wrap="square" rtlCol="0">
+            <a:spAutoFit/>
+          </a:bodyPr>
+          <a:lstStyle/>
+          <a:p>
+            <a:pPr algn="ctr"/>
+            <a:r>
+              <a:rPr lang="en-US" dirty="0"/>
+              <a:t>12</a:t>
+            </a:r>
+          </a:p>
+        </p:txBody>
+      </p:sp>
+      <p:sp>
+        <p:nvSpPr>
+          <p:cNvPr id="11" name="TextBox 10">
+            <a:extLst>
+              <a:ext uri="{FF2B5EF4-FFF2-40B4-BE49-F238E27FC236}">
+                <a16:creationId xmlns:a16="http://schemas.microsoft.com/office/drawing/2014/main" id="{4AF9B472-7155-4F58-BBE0-E14AADF0BF29}"/>
+              </a:ext>
+            </a:extLst>
+          </p:cNvPr>
+          <p:cNvSpPr txBox="1"/>
+          <p:nvPr/>
+        </p:nvSpPr>
+        <p:spPr>
+          <a:xfrm>
+            <a:off x="5676866" y="3433596"/>
+            <a:ext cx="1152533" cy="369332"/>
+          </a:xfrm>
+          <a:prstGeom prst="rect">
+            <a:avLst/>
+          </a:prstGeom>
+          <a:noFill/>
+        </p:spPr>
+        <p:txBody>
+          <a:bodyPr wrap="square" rtlCol="0">
+            <a:spAutoFit/>
+          </a:bodyPr>
+          <a:lstStyle/>
+          <a:p>
+            <a:pPr algn="ctr"/>
+            <a:r>
+              <a:rPr lang="en-US" dirty="0"/>
+              <a:t>13</a:t>
+            </a:r>
+          </a:p>
+        </p:txBody>
+      </p:sp>
+      <p:sp>
+        <p:nvSpPr>
+          <p:cNvPr id="13" name="Oval 12">
+            <a:extLst>
+              <a:ext uri="{FF2B5EF4-FFF2-40B4-BE49-F238E27FC236}">
+                <a16:creationId xmlns:a16="http://schemas.microsoft.com/office/drawing/2014/main" id="{4447EB9E-B6BA-4B85-88F8-F3FEE2FA7786}"/>
+              </a:ext>
+            </a:extLst>
+          </p:cNvPr>
+          <p:cNvSpPr/>
+          <p:nvPr/>
+        </p:nvSpPr>
+        <p:spPr>
+          <a:xfrm>
+            <a:off x="6410265" y="3496235"/>
+            <a:ext cx="838329" cy="177501"/>
+          </a:xfrm>
+          <a:prstGeom prst="ellipse">
+            <a:avLst/>
+          </a:prstGeom>
+          <a:noFill/>
+          <a:ln w="28575">
+            <a:solidFill>
+              <a:srgbClr val="FF0000"/>
+            </a:solidFill>
+          </a:ln>
+        </p:spPr>
+        <p:style>
+          <a:lnRef idx="2">
+            <a:schemeClr val="accent1">
+              <a:shade val="50000"/>
+            </a:schemeClr>
+          </a:lnRef>
+          <a:fillRef idx="1">
+            <a:schemeClr val="accent1"/>
+          </a:fillRef>
+          <a:effectRef idx="0">
+            <a:schemeClr val="accent1"/>
+          </a:effectRef>
+          <a:fontRef idx="minor">
+            <a:schemeClr val="lt1"/>
+          </a:fontRef>
+        </p:style>
+        <p:txBody>
+          <a:bodyPr rtlCol="0" anchor="ctr"/>
+          <a:lstStyle/>
+          <a:p>
+            <a:pPr algn="ctr"/>
+            <a:endParaRPr lang="en-US" dirty="0"/>
+          </a:p>
+        </p:txBody>
+      </p:sp>
+    </p:spTree>
+    <p:extLst>
+      <p:ext uri="{BB962C8B-B14F-4D97-AF65-F5344CB8AC3E}">
+        <p14:creationId xmlns:p14="http://schemas.microsoft.com/office/powerpoint/2010/main" val="2554346104"/>
+      </p:ext>
+    </p:extLst>
+  </p:cSld>
+  <p:clrMapOvr>
+    <a:masterClrMapping/>
+  </p:clrMapOvr>
+</p:sld>
+</file>
+
+<file path=ppt/slides/slide19.xml><?xml version="1.0" encoding="utf-8"?>
+<p:sld xmlns:a="http://schemas.openxmlformats.org/drawingml/2006/main" xmlns:r="http://schemas.openxmlformats.org/officeDocument/2006/relationships" xmlns:p="http://schemas.openxmlformats.org/presentationml/2006/main">
+  <p:cSld>
+    <p:spTree>
+      <p:nvGrpSpPr>
+        <p:cNvPr id="1" name=""/>
+        <p:cNvGrpSpPr/>
+        <p:nvPr/>
+      </p:nvGrpSpPr>
+      <p:grpSpPr>
+        <a:xfrm>
+          <a:off x="0" y="0"/>
+          <a:ext cx="0" cy="0"/>
+          <a:chOff x="0" y="0"/>
+          <a:chExt cx="0" cy="0"/>
+        </a:xfrm>
+      </p:grpSpPr>
+      <p:pic>
+        <p:nvPicPr>
+          <p:cNvPr id="2" name="Picture 1">
+            <a:extLst>
+              <a:ext uri="{FF2B5EF4-FFF2-40B4-BE49-F238E27FC236}">
+                <a16:creationId xmlns:a16="http://schemas.microsoft.com/office/drawing/2014/main" id="{8F361E55-22EF-4BED-9C8A-C967B5610CC8}"/>
+              </a:ext>
+            </a:extLst>
+          </p:cNvPr>
+          <p:cNvPicPr>
+            <a:picLocks noChangeAspect="1"/>
+          </p:cNvPicPr>
+          <p:nvPr/>
+        </p:nvPicPr>
+        <p:blipFill>
+          <a:blip r:embed="rId2"/>
+          <a:stretch>
+            <a:fillRect/>
+          </a:stretch>
+        </p:blipFill>
+        <p:spPr>
+          <a:xfrm>
+            <a:off x="443342" y="766800"/>
+            <a:ext cx="4829210" cy="4743485"/>
+          </a:xfrm>
+          <a:prstGeom prst="rect">
+            <a:avLst/>
+          </a:prstGeom>
+        </p:spPr>
+      </p:pic>
+      <p:cxnSp>
+        <p:nvCxnSpPr>
+          <p:cNvPr id="5" name="Straight Arrow Connector 4">
+            <a:extLst>
+              <a:ext uri="{FF2B5EF4-FFF2-40B4-BE49-F238E27FC236}">
+                <a16:creationId xmlns:a16="http://schemas.microsoft.com/office/drawing/2014/main" id="{C5CF4DB3-1976-4612-8024-17775FCE6B31}"/>
+              </a:ext>
+            </a:extLst>
+          </p:cNvPr>
+          <p:cNvCxnSpPr/>
+          <p:nvPr/>
+        </p:nvCxnSpPr>
+        <p:spPr>
+          <a:xfrm>
+            <a:off x="5527754" y="3005791"/>
+            <a:ext cx="340822" cy="0"/>
+          </a:xfrm>
+          <a:prstGeom prst="straightConnector1">
+            <a:avLst/>
+          </a:prstGeom>
+          <a:ln w="28575">
+            <a:solidFill>
+              <a:srgbClr val="FF0000"/>
+            </a:solidFill>
+            <a:tailEnd type="triangle"/>
+          </a:ln>
+        </p:spPr>
+        <p:style>
+          <a:lnRef idx="1">
+            <a:schemeClr val="accent1"/>
+          </a:lnRef>
+          <a:fillRef idx="0">
+            <a:schemeClr val="accent1"/>
+          </a:fillRef>
+          <a:effectRef idx="0">
+            <a:schemeClr val="accent1"/>
+          </a:effectRef>
+          <a:fontRef idx="minor">
+            <a:schemeClr val="tx1"/>
+          </a:fontRef>
+        </p:style>
+      </p:cxnSp>
+      <p:sp>
+        <p:nvSpPr>
+          <p:cNvPr id="6" name="Oval 5">
+            <a:extLst>
+              <a:ext uri="{FF2B5EF4-FFF2-40B4-BE49-F238E27FC236}">
+                <a16:creationId xmlns:a16="http://schemas.microsoft.com/office/drawing/2014/main" id="{4211DAF3-1611-4D93-B8CF-B0CD5E7D9D78}"/>
+              </a:ext>
+            </a:extLst>
+          </p:cNvPr>
+          <p:cNvSpPr/>
+          <p:nvPr/>
+        </p:nvSpPr>
+        <p:spPr>
+          <a:xfrm>
+            <a:off x="1784631" y="1061421"/>
+            <a:ext cx="390376" cy="363389"/>
+          </a:xfrm>
+          <a:prstGeom prst="ellipse">
+            <a:avLst/>
+          </a:prstGeom>
+          <a:noFill/>
+          <a:ln w="28575">
+            <a:solidFill>
+              <a:srgbClr val="FF0000"/>
+            </a:solidFill>
+          </a:ln>
+        </p:spPr>
+        <p:style>
+          <a:lnRef idx="2">
+            <a:schemeClr val="accent1">
+              <a:shade val="50000"/>
+            </a:schemeClr>
+          </a:lnRef>
+          <a:fillRef idx="1">
+            <a:schemeClr val="accent1"/>
+          </a:fillRef>
+          <a:effectRef idx="0">
+            <a:schemeClr val="accent1"/>
+          </a:effectRef>
+          <a:fontRef idx="minor">
+            <a:schemeClr val="lt1"/>
+          </a:fontRef>
+        </p:style>
+        <p:txBody>
+          <a:bodyPr rtlCol="0" anchor="ctr"/>
+          <a:lstStyle/>
+          <a:p>
+            <a:pPr algn="ctr"/>
+            <a:endParaRPr lang="en-US" dirty="0"/>
+          </a:p>
+        </p:txBody>
+      </p:sp>
+      <p:sp>
+        <p:nvSpPr>
+          <p:cNvPr id="7" name="TextBox 6">
+            <a:extLst>
+              <a:ext uri="{FF2B5EF4-FFF2-40B4-BE49-F238E27FC236}">
+                <a16:creationId xmlns:a16="http://schemas.microsoft.com/office/drawing/2014/main" id="{5C6B1BE0-E6A4-4849-B2A3-591B664D3254}"/>
+              </a:ext>
+            </a:extLst>
+          </p:cNvPr>
+          <p:cNvSpPr txBox="1"/>
+          <p:nvPr/>
+        </p:nvSpPr>
+        <p:spPr>
+          <a:xfrm>
+            <a:off x="1091613" y="1240144"/>
+            <a:ext cx="1152533" cy="369332"/>
+          </a:xfrm>
+          <a:prstGeom prst="rect">
+            <a:avLst/>
+          </a:prstGeom>
+          <a:noFill/>
+        </p:spPr>
+        <p:txBody>
+          <a:bodyPr wrap="square" rtlCol="0">
+            <a:spAutoFit/>
+          </a:bodyPr>
+          <a:lstStyle/>
+          <a:p>
+            <a:pPr algn="ctr"/>
+            <a:r>
+              <a:rPr lang="en-US" dirty="0"/>
+              <a:t>14</a:t>
+            </a:r>
+          </a:p>
+        </p:txBody>
+      </p:sp>
+      <p:pic>
+        <p:nvPicPr>
+          <p:cNvPr id="4" name="Picture 3">
+            <a:extLst>
+              <a:ext uri="{FF2B5EF4-FFF2-40B4-BE49-F238E27FC236}">
+                <a16:creationId xmlns:a16="http://schemas.microsoft.com/office/drawing/2014/main" id="{FF4CFCDA-81C9-40C1-9C3C-DD06157518A2}"/>
+              </a:ext>
+            </a:extLst>
+          </p:cNvPr>
+          <p:cNvPicPr>
+            <a:picLocks noChangeAspect="1"/>
+          </p:cNvPicPr>
+          <p:nvPr/>
+        </p:nvPicPr>
+        <p:blipFill>
+          <a:blip r:embed="rId3"/>
+          <a:stretch>
+            <a:fillRect/>
+          </a:stretch>
+        </p:blipFill>
+        <p:spPr>
+          <a:xfrm>
+            <a:off x="5972141" y="2641457"/>
+            <a:ext cx="1452573" cy="728668"/>
+          </a:xfrm>
+          <a:prstGeom prst="rect">
+            <a:avLst/>
+          </a:prstGeom>
+        </p:spPr>
+      </p:pic>
+      <p:sp>
+        <p:nvSpPr>
+          <p:cNvPr id="16" name="Oval 15">
+            <a:extLst>
+              <a:ext uri="{FF2B5EF4-FFF2-40B4-BE49-F238E27FC236}">
+                <a16:creationId xmlns:a16="http://schemas.microsoft.com/office/drawing/2014/main" id="{F1697F6B-189D-4D7D-80A5-595EBF2E5739}"/>
+              </a:ext>
+            </a:extLst>
+          </p:cNvPr>
+          <p:cNvSpPr/>
+          <p:nvPr/>
+        </p:nvSpPr>
+        <p:spPr>
+          <a:xfrm>
+            <a:off x="6636159" y="2877671"/>
+            <a:ext cx="727450" cy="225910"/>
+          </a:xfrm>
+          <a:prstGeom prst="ellipse">
+            <a:avLst/>
+          </a:prstGeom>
+          <a:noFill/>
+          <a:ln w="28575">
+            <a:solidFill>
+              <a:srgbClr val="FF0000"/>
+            </a:solidFill>
+          </a:ln>
+        </p:spPr>
+        <p:style>
+          <a:lnRef idx="2">
+            <a:schemeClr val="accent1">
+              <a:shade val="50000"/>
+            </a:schemeClr>
+          </a:lnRef>
+          <a:fillRef idx="1">
+            <a:schemeClr val="accent1"/>
+          </a:fillRef>
+          <a:effectRef idx="0">
+            <a:schemeClr val="accent1"/>
+          </a:effectRef>
+          <a:fontRef idx="minor">
+            <a:schemeClr val="lt1"/>
+          </a:fontRef>
+        </p:style>
+        <p:txBody>
+          <a:bodyPr rtlCol="0" anchor="ctr"/>
+          <a:lstStyle/>
+          <a:p>
+            <a:pPr algn="ctr"/>
+            <a:endParaRPr lang="en-US" dirty="0"/>
+          </a:p>
+        </p:txBody>
+      </p:sp>
+      <p:sp>
+        <p:nvSpPr>
+          <p:cNvPr id="17" name="TextBox 16">
+            <a:extLst>
+              <a:ext uri="{FF2B5EF4-FFF2-40B4-BE49-F238E27FC236}">
+                <a16:creationId xmlns:a16="http://schemas.microsoft.com/office/drawing/2014/main" id="{843DF0FA-8721-4A94-9023-6DD76456B340}"/>
+              </a:ext>
+            </a:extLst>
+          </p:cNvPr>
+          <p:cNvSpPr txBox="1"/>
+          <p:nvPr/>
+        </p:nvSpPr>
+        <p:spPr>
+          <a:xfrm>
+            <a:off x="6999884" y="2805960"/>
+            <a:ext cx="1152533" cy="369332"/>
+          </a:xfrm>
+          <a:prstGeom prst="rect">
+            <a:avLst/>
+          </a:prstGeom>
+          <a:noFill/>
+        </p:spPr>
+        <p:txBody>
+          <a:bodyPr wrap="square" rtlCol="0">
+            <a:spAutoFit/>
+          </a:bodyPr>
+          <a:lstStyle/>
+          <a:p>
+            <a:pPr algn="ctr"/>
+            <a:r>
+              <a:rPr lang="en-US" dirty="0"/>
+              <a:t>15</a:t>
+            </a:r>
+          </a:p>
+        </p:txBody>
+      </p:sp>
+    </p:spTree>
+    <p:extLst>
+      <p:ext uri="{BB962C8B-B14F-4D97-AF65-F5344CB8AC3E}">
+        <p14:creationId xmlns:p14="http://schemas.microsoft.com/office/powerpoint/2010/main" val="3611356848"/>
       </p:ext>
     </p:extLst>
   </p:cSld>
@@ -5661,6 +9159,654 @@
     <p:extLst>
       <p:ext uri="{BB962C8B-B14F-4D97-AF65-F5344CB8AC3E}">
         <p14:creationId xmlns:p14="http://schemas.microsoft.com/office/powerpoint/2010/main" val="1859205260"/>
+      </p:ext>
+    </p:extLst>
+  </p:cSld>
+  <p:clrMapOvr>
+    <a:masterClrMapping/>
+  </p:clrMapOvr>
+</p:sld>
+</file>
+
+<file path=ppt/slides/slide20.xml><?xml version="1.0" encoding="utf-8"?>
+<p:sld xmlns:a="http://schemas.openxmlformats.org/drawingml/2006/main" xmlns:r="http://schemas.openxmlformats.org/officeDocument/2006/relationships" xmlns:p="http://schemas.openxmlformats.org/presentationml/2006/main">
+  <p:cSld>
+    <p:spTree>
+      <p:nvGrpSpPr>
+        <p:cNvPr id="1" name=""/>
+        <p:cNvGrpSpPr/>
+        <p:nvPr/>
+      </p:nvGrpSpPr>
+      <p:grpSpPr>
+        <a:xfrm>
+          <a:off x="0" y="0"/>
+          <a:ext cx="0" cy="0"/>
+          <a:chOff x="0" y="0"/>
+          <a:chExt cx="0" cy="0"/>
+        </a:xfrm>
+      </p:grpSpPr>
+      <p:pic>
+        <p:nvPicPr>
+          <p:cNvPr id="3" name="Picture 2">
+            <a:extLst>
+              <a:ext uri="{FF2B5EF4-FFF2-40B4-BE49-F238E27FC236}">
+                <a16:creationId xmlns:a16="http://schemas.microsoft.com/office/drawing/2014/main" id="{A0711920-F8B7-4ABB-A81B-D4DD54CD5076}"/>
+              </a:ext>
+            </a:extLst>
+          </p:cNvPr>
+          <p:cNvPicPr>
+            <a:picLocks noChangeAspect="1"/>
+          </p:cNvPicPr>
+          <p:nvPr/>
+        </p:nvPicPr>
+        <p:blipFill>
+          <a:blip r:embed="rId2"/>
+          <a:stretch>
+            <a:fillRect/>
+          </a:stretch>
+        </p:blipFill>
+        <p:spPr>
+          <a:xfrm>
+            <a:off x="1115524" y="1169177"/>
+            <a:ext cx="5657891" cy="4519646"/>
+          </a:xfrm>
+          <a:prstGeom prst="rect">
+            <a:avLst/>
+          </a:prstGeom>
+        </p:spPr>
+      </p:pic>
+      <p:sp>
+        <p:nvSpPr>
+          <p:cNvPr id="4" name="Oval 3">
+            <a:extLst>
+              <a:ext uri="{FF2B5EF4-FFF2-40B4-BE49-F238E27FC236}">
+                <a16:creationId xmlns:a16="http://schemas.microsoft.com/office/drawing/2014/main" id="{9B63A7E7-7E21-4B87-B939-EF1A69EFF4BF}"/>
+              </a:ext>
+            </a:extLst>
+          </p:cNvPr>
+          <p:cNvSpPr/>
+          <p:nvPr/>
+        </p:nvSpPr>
+        <p:spPr>
+          <a:xfrm>
+            <a:off x="2770094" y="1418388"/>
+            <a:ext cx="297943" cy="393698"/>
+          </a:xfrm>
+          <a:prstGeom prst="ellipse">
+            <a:avLst/>
+          </a:prstGeom>
+          <a:noFill/>
+          <a:ln w="28575">
+            <a:solidFill>
+              <a:srgbClr val="FF0000"/>
+            </a:solidFill>
+          </a:ln>
+        </p:spPr>
+        <p:style>
+          <a:lnRef idx="2">
+            <a:schemeClr val="accent1">
+              <a:shade val="50000"/>
+            </a:schemeClr>
+          </a:lnRef>
+          <a:fillRef idx="1">
+            <a:schemeClr val="accent1"/>
+          </a:fillRef>
+          <a:effectRef idx="0">
+            <a:schemeClr val="accent1"/>
+          </a:effectRef>
+          <a:fontRef idx="minor">
+            <a:schemeClr val="lt1"/>
+          </a:fontRef>
+        </p:style>
+        <p:txBody>
+          <a:bodyPr rtlCol="0" anchor="ctr"/>
+          <a:lstStyle/>
+          <a:p>
+            <a:pPr algn="ctr"/>
+            <a:endParaRPr lang="en-US" dirty="0"/>
+          </a:p>
+        </p:txBody>
+      </p:sp>
+      <p:sp>
+        <p:nvSpPr>
+          <p:cNvPr id="5" name="TextBox 4">
+            <a:extLst>
+              <a:ext uri="{FF2B5EF4-FFF2-40B4-BE49-F238E27FC236}">
+                <a16:creationId xmlns:a16="http://schemas.microsoft.com/office/drawing/2014/main" id="{3704565E-648A-4534-BEF9-B11508EBBDC2}"/>
+              </a:ext>
+            </a:extLst>
+          </p:cNvPr>
+          <p:cNvSpPr txBox="1"/>
+          <p:nvPr/>
+        </p:nvSpPr>
+        <p:spPr>
+          <a:xfrm>
+            <a:off x="2038286" y="1630390"/>
+            <a:ext cx="1152533" cy="369332"/>
+          </a:xfrm>
+          <a:prstGeom prst="rect">
+            <a:avLst/>
+          </a:prstGeom>
+          <a:noFill/>
+        </p:spPr>
+        <p:txBody>
+          <a:bodyPr wrap="square" rtlCol="0">
+            <a:spAutoFit/>
+          </a:bodyPr>
+          <a:lstStyle/>
+          <a:p>
+            <a:pPr algn="ctr"/>
+            <a:r>
+              <a:rPr lang="en-US" dirty="0"/>
+              <a:t>16</a:t>
+            </a:r>
+          </a:p>
+        </p:txBody>
+      </p:sp>
+      <p:sp>
+        <p:nvSpPr>
+          <p:cNvPr id="6" name="Oval 5">
+            <a:extLst>
+              <a:ext uri="{FF2B5EF4-FFF2-40B4-BE49-F238E27FC236}">
+                <a16:creationId xmlns:a16="http://schemas.microsoft.com/office/drawing/2014/main" id="{23C23FB0-33FB-43FC-A6AF-4BAD08A1FE09}"/>
+              </a:ext>
+            </a:extLst>
+          </p:cNvPr>
+          <p:cNvSpPr/>
+          <p:nvPr/>
+        </p:nvSpPr>
+        <p:spPr>
+          <a:xfrm>
+            <a:off x="817581" y="2289585"/>
+            <a:ext cx="3130475" cy="1185135"/>
+          </a:xfrm>
+          <a:prstGeom prst="ellipse">
+            <a:avLst/>
+          </a:prstGeom>
+          <a:noFill/>
+          <a:ln w="28575">
+            <a:solidFill>
+              <a:srgbClr val="FF0000"/>
+            </a:solidFill>
+          </a:ln>
+        </p:spPr>
+        <p:style>
+          <a:lnRef idx="2">
+            <a:schemeClr val="accent1">
+              <a:shade val="50000"/>
+            </a:schemeClr>
+          </a:lnRef>
+          <a:fillRef idx="1">
+            <a:schemeClr val="accent1"/>
+          </a:fillRef>
+          <a:effectRef idx="0">
+            <a:schemeClr val="accent1"/>
+          </a:effectRef>
+          <a:fontRef idx="minor">
+            <a:schemeClr val="lt1"/>
+          </a:fontRef>
+        </p:style>
+        <p:txBody>
+          <a:bodyPr rtlCol="0" anchor="ctr"/>
+          <a:lstStyle/>
+          <a:p>
+            <a:pPr algn="ctr"/>
+            <a:endParaRPr lang="en-US" dirty="0"/>
+          </a:p>
+        </p:txBody>
+      </p:sp>
+      <p:sp>
+        <p:nvSpPr>
+          <p:cNvPr id="7" name="Oval 6">
+            <a:extLst>
+              <a:ext uri="{FF2B5EF4-FFF2-40B4-BE49-F238E27FC236}">
+                <a16:creationId xmlns:a16="http://schemas.microsoft.com/office/drawing/2014/main" id="{C90178F7-4AEC-4E28-8439-2501C16FAB5E}"/>
+              </a:ext>
+            </a:extLst>
+          </p:cNvPr>
+          <p:cNvSpPr/>
+          <p:nvPr/>
+        </p:nvSpPr>
+        <p:spPr>
+          <a:xfrm>
+            <a:off x="614978" y="3856615"/>
+            <a:ext cx="3130475" cy="1552689"/>
+          </a:xfrm>
+          <a:prstGeom prst="ellipse">
+            <a:avLst/>
+          </a:prstGeom>
+          <a:noFill/>
+          <a:ln w="28575">
+            <a:solidFill>
+              <a:srgbClr val="FF0000"/>
+            </a:solidFill>
+          </a:ln>
+        </p:spPr>
+        <p:style>
+          <a:lnRef idx="2">
+            <a:schemeClr val="accent1">
+              <a:shade val="50000"/>
+            </a:schemeClr>
+          </a:lnRef>
+          <a:fillRef idx="1">
+            <a:schemeClr val="accent1"/>
+          </a:fillRef>
+          <a:effectRef idx="0">
+            <a:schemeClr val="accent1"/>
+          </a:effectRef>
+          <a:fontRef idx="minor">
+            <a:schemeClr val="lt1"/>
+          </a:fontRef>
+        </p:style>
+        <p:txBody>
+          <a:bodyPr rtlCol="0" anchor="ctr"/>
+          <a:lstStyle/>
+          <a:p>
+            <a:pPr algn="ctr"/>
+            <a:endParaRPr lang="en-US" dirty="0"/>
+          </a:p>
+        </p:txBody>
+      </p:sp>
+      <p:sp>
+        <p:nvSpPr>
+          <p:cNvPr id="8" name="TextBox 7">
+            <a:extLst>
+              <a:ext uri="{FF2B5EF4-FFF2-40B4-BE49-F238E27FC236}">
+                <a16:creationId xmlns:a16="http://schemas.microsoft.com/office/drawing/2014/main" id="{6B4DD72B-4E6F-4F85-8253-C725C9B081AE}"/>
+              </a:ext>
+            </a:extLst>
+          </p:cNvPr>
+          <p:cNvSpPr txBox="1"/>
+          <p:nvPr/>
+        </p:nvSpPr>
+        <p:spPr>
+          <a:xfrm>
+            <a:off x="3121680" y="2697486"/>
+            <a:ext cx="1152533" cy="369332"/>
+          </a:xfrm>
+          <a:prstGeom prst="rect">
+            <a:avLst/>
+          </a:prstGeom>
+          <a:noFill/>
+        </p:spPr>
+        <p:txBody>
+          <a:bodyPr wrap="square" rtlCol="0">
+            <a:spAutoFit/>
+          </a:bodyPr>
+          <a:lstStyle/>
+          <a:p>
+            <a:pPr algn="ctr"/>
+            <a:r>
+              <a:rPr lang="en-US" dirty="0"/>
+              <a:t>17</a:t>
+            </a:r>
+          </a:p>
+        </p:txBody>
+      </p:sp>
+      <p:sp>
+        <p:nvSpPr>
+          <p:cNvPr id="9" name="TextBox 8">
+            <a:extLst>
+              <a:ext uri="{FF2B5EF4-FFF2-40B4-BE49-F238E27FC236}">
+                <a16:creationId xmlns:a16="http://schemas.microsoft.com/office/drawing/2014/main" id="{6AF6C51C-02F3-46C2-8118-8438F242C114}"/>
+              </a:ext>
+            </a:extLst>
+          </p:cNvPr>
+          <p:cNvSpPr txBox="1"/>
+          <p:nvPr/>
+        </p:nvSpPr>
+        <p:spPr>
+          <a:xfrm>
+            <a:off x="2926492" y="4448293"/>
+            <a:ext cx="1152533" cy="369332"/>
+          </a:xfrm>
+          <a:prstGeom prst="rect">
+            <a:avLst/>
+          </a:prstGeom>
+          <a:noFill/>
+        </p:spPr>
+        <p:txBody>
+          <a:bodyPr wrap="square" rtlCol="0">
+            <a:spAutoFit/>
+          </a:bodyPr>
+          <a:lstStyle/>
+          <a:p>
+            <a:pPr algn="ctr"/>
+            <a:r>
+              <a:rPr lang="en-US" dirty="0"/>
+              <a:t>18</a:t>
+            </a:r>
+          </a:p>
+        </p:txBody>
+      </p:sp>
+      <p:sp>
+        <p:nvSpPr>
+          <p:cNvPr id="10" name="Oval 9">
+            <a:extLst>
+              <a:ext uri="{FF2B5EF4-FFF2-40B4-BE49-F238E27FC236}">
+                <a16:creationId xmlns:a16="http://schemas.microsoft.com/office/drawing/2014/main" id="{84B1F313-CDC6-4C28-8A15-8A1D49A8658E}"/>
+              </a:ext>
+            </a:extLst>
+          </p:cNvPr>
+          <p:cNvSpPr/>
+          <p:nvPr/>
+        </p:nvSpPr>
+        <p:spPr>
+          <a:xfrm>
+            <a:off x="3094784" y="1361629"/>
+            <a:ext cx="297943" cy="459251"/>
+          </a:xfrm>
+          <a:prstGeom prst="ellipse">
+            <a:avLst/>
+          </a:prstGeom>
+          <a:noFill/>
+          <a:ln w="28575">
+            <a:solidFill>
+              <a:srgbClr val="FF0000"/>
+            </a:solidFill>
+          </a:ln>
+        </p:spPr>
+        <p:style>
+          <a:lnRef idx="2">
+            <a:schemeClr val="accent1">
+              <a:shade val="50000"/>
+            </a:schemeClr>
+          </a:lnRef>
+          <a:fillRef idx="1">
+            <a:schemeClr val="accent1"/>
+          </a:fillRef>
+          <a:effectRef idx="0">
+            <a:schemeClr val="accent1"/>
+          </a:effectRef>
+          <a:fontRef idx="minor">
+            <a:schemeClr val="lt1"/>
+          </a:fontRef>
+        </p:style>
+        <p:txBody>
+          <a:bodyPr rtlCol="0" anchor="ctr"/>
+          <a:lstStyle/>
+          <a:p>
+            <a:pPr algn="ctr"/>
+            <a:endParaRPr lang="en-US" dirty="0"/>
+          </a:p>
+        </p:txBody>
+      </p:sp>
+      <p:sp>
+        <p:nvSpPr>
+          <p:cNvPr id="11" name="TextBox 10">
+            <a:extLst>
+              <a:ext uri="{FF2B5EF4-FFF2-40B4-BE49-F238E27FC236}">
+                <a16:creationId xmlns:a16="http://schemas.microsoft.com/office/drawing/2014/main" id="{932DA44E-1C11-4ACE-9069-8E43A7C2B94C}"/>
+              </a:ext>
+            </a:extLst>
+          </p:cNvPr>
+          <p:cNvSpPr txBox="1"/>
+          <p:nvPr/>
+        </p:nvSpPr>
+        <p:spPr>
+          <a:xfrm>
+            <a:off x="2648168" y="1075438"/>
+            <a:ext cx="1152533" cy="369332"/>
+          </a:xfrm>
+          <a:prstGeom prst="rect">
+            <a:avLst/>
+          </a:prstGeom>
+          <a:noFill/>
+        </p:spPr>
+        <p:txBody>
+          <a:bodyPr wrap="square" rtlCol="0">
+            <a:spAutoFit/>
+          </a:bodyPr>
+          <a:lstStyle/>
+          <a:p>
+            <a:pPr algn="ctr"/>
+            <a:r>
+              <a:rPr lang="en-US" dirty="0"/>
+              <a:t>19</a:t>
+            </a:r>
+          </a:p>
+        </p:txBody>
+      </p:sp>
+    </p:spTree>
+    <p:extLst>
+      <p:ext uri="{BB962C8B-B14F-4D97-AF65-F5344CB8AC3E}">
+        <p14:creationId xmlns:p14="http://schemas.microsoft.com/office/powerpoint/2010/main" val="80217937"/>
+      </p:ext>
+    </p:extLst>
+  </p:cSld>
+  <p:clrMapOvr>
+    <a:masterClrMapping/>
+  </p:clrMapOvr>
+</p:sld>
+</file>
+
+<file path=ppt/slides/slide21.xml><?xml version="1.0" encoding="utf-8"?>
+<p:sld xmlns:a="http://schemas.openxmlformats.org/drawingml/2006/main" xmlns:r="http://schemas.openxmlformats.org/officeDocument/2006/relationships" xmlns:p="http://schemas.openxmlformats.org/presentationml/2006/main">
+  <p:cSld>
+    <p:spTree>
+      <p:nvGrpSpPr>
+        <p:cNvPr id="1" name=""/>
+        <p:cNvGrpSpPr/>
+        <p:nvPr/>
+      </p:nvGrpSpPr>
+      <p:grpSpPr>
+        <a:xfrm>
+          <a:off x="0" y="0"/>
+          <a:ext cx="0" cy="0"/>
+          <a:chOff x="0" y="0"/>
+          <a:chExt cx="0" cy="0"/>
+        </a:xfrm>
+      </p:grpSpPr>
+      <p:pic>
+        <p:nvPicPr>
+          <p:cNvPr id="3" name="Picture 2">
+            <a:extLst>
+              <a:ext uri="{FF2B5EF4-FFF2-40B4-BE49-F238E27FC236}">
+                <a16:creationId xmlns:a16="http://schemas.microsoft.com/office/drawing/2014/main" id="{A0711920-F8B7-4ABB-A81B-D4DD54CD5076}"/>
+              </a:ext>
+            </a:extLst>
+          </p:cNvPr>
+          <p:cNvPicPr>
+            <a:picLocks noChangeAspect="1"/>
+          </p:cNvPicPr>
+          <p:nvPr/>
+        </p:nvPicPr>
+        <p:blipFill>
+          <a:blip r:embed="rId2"/>
+          <a:stretch>
+            <a:fillRect/>
+          </a:stretch>
+        </p:blipFill>
+        <p:spPr>
+          <a:xfrm>
+            <a:off x="1115524" y="1169177"/>
+            <a:ext cx="5657891" cy="4519646"/>
+          </a:xfrm>
+          <a:prstGeom prst="rect">
+            <a:avLst/>
+          </a:prstGeom>
+        </p:spPr>
+      </p:pic>
+      <p:sp>
+        <p:nvSpPr>
+          <p:cNvPr id="4" name="Oval 3">
+            <a:extLst>
+              <a:ext uri="{FF2B5EF4-FFF2-40B4-BE49-F238E27FC236}">
+                <a16:creationId xmlns:a16="http://schemas.microsoft.com/office/drawing/2014/main" id="{9B63A7E7-7E21-4B87-B939-EF1A69EFF4BF}"/>
+              </a:ext>
+            </a:extLst>
+          </p:cNvPr>
+          <p:cNvSpPr/>
+          <p:nvPr/>
+        </p:nvSpPr>
+        <p:spPr>
+          <a:xfrm>
+            <a:off x="3496234" y="1418388"/>
+            <a:ext cx="297943" cy="393698"/>
+          </a:xfrm>
+          <a:prstGeom prst="ellipse">
+            <a:avLst/>
+          </a:prstGeom>
+          <a:noFill/>
+          <a:ln w="28575">
+            <a:solidFill>
+              <a:srgbClr val="FF0000"/>
+            </a:solidFill>
+          </a:ln>
+        </p:spPr>
+        <p:style>
+          <a:lnRef idx="2">
+            <a:schemeClr val="accent1">
+              <a:shade val="50000"/>
+            </a:schemeClr>
+          </a:lnRef>
+          <a:fillRef idx="1">
+            <a:schemeClr val="accent1"/>
+          </a:fillRef>
+          <a:effectRef idx="0">
+            <a:schemeClr val="accent1"/>
+          </a:effectRef>
+          <a:fontRef idx="minor">
+            <a:schemeClr val="lt1"/>
+          </a:fontRef>
+        </p:style>
+        <p:txBody>
+          <a:bodyPr rtlCol="0" anchor="ctr"/>
+          <a:lstStyle/>
+          <a:p>
+            <a:pPr algn="ctr"/>
+            <a:endParaRPr lang="en-US" dirty="0"/>
+          </a:p>
+        </p:txBody>
+      </p:sp>
+      <p:sp>
+        <p:nvSpPr>
+          <p:cNvPr id="5" name="TextBox 4">
+            <a:extLst>
+              <a:ext uri="{FF2B5EF4-FFF2-40B4-BE49-F238E27FC236}">
+                <a16:creationId xmlns:a16="http://schemas.microsoft.com/office/drawing/2014/main" id="{3704565E-648A-4534-BEF9-B11508EBBDC2}"/>
+              </a:ext>
+            </a:extLst>
+          </p:cNvPr>
+          <p:cNvSpPr txBox="1"/>
+          <p:nvPr/>
+        </p:nvSpPr>
+        <p:spPr>
+          <a:xfrm>
+            <a:off x="2764426" y="1627420"/>
+            <a:ext cx="1152533" cy="369332"/>
+          </a:xfrm>
+          <a:prstGeom prst="rect">
+            <a:avLst/>
+          </a:prstGeom>
+          <a:noFill/>
+        </p:spPr>
+        <p:txBody>
+          <a:bodyPr wrap="square" rtlCol="0">
+            <a:spAutoFit/>
+          </a:bodyPr>
+          <a:lstStyle/>
+          <a:p>
+            <a:pPr algn="ctr"/>
+            <a:r>
+              <a:rPr lang="en-US" dirty="0"/>
+              <a:t>20</a:t>
+            </a:r>
+          </a:p>
+        </p:txBody>
+      </p:sp>
+      <p:sp>
+        <p:nvSpPr>
+          <p:cNvPr id="10" name="Oval 9">
+            <a:extLst>
+              <a:ext uri="{FF2B5EF4-FFF2-40B4-BE49-F238E27FC236}">
+                <a16:creationId xmlns:a16="http://schemas.microsoft.com/office/drawing/2014/main" id="{84B1F313-CDC6-4C28-8A15-8A1D49A8658E}"/>
+              </a:ext>
+            </a:extLst>
+          </p:cNvPr>
+          <p:cNvSpPr/>
+          <p:nvPr/>
+        </p:nvSpPr>
+        <p:spPr>
+          <a:xfrm>
+            <a:off x="3976910" y="1361629"/>
+            <a:ext cx="297943" cy="459251"/>
+          </a:xfrm>
+          <a:prstGeom prst="ellipse">
+            <a:avLst/>
+          </a:prstGeom>
+          <a:noFill/>
+          <a:ln w="28575">
+            <a:solidFill>
+              <a:srgbClr val="FF0000"/>
+            </a:solidFill>
+          </a:ln>
+        </p:spPr>
+        <p:style>
+          <a:lnRef idx="2">
+            <a:schemeClr val="accent1">
+              <a:shade val="50000"/>
+            </a:schemeClr>
+          </a:lnRef>
+          <a:fillRef idx="1">
+            <a:schemeClr val="accent1"/>
+          </a:fillRef>
+          <a:effectRef idx="0">
+            <a:schemeClr val="accent1"/>
+          </a:effectRef>
+          <a:fontRef idx="minor">
+            <a:schemeClr val="lt1"/>
+          </a:fontRef>
+        </p:style>
+        <p:txBody>
+          <a:bodyPr rtlCol="0" anchor="ctr"/>
+          <a:lstStyle/>
+          <a:p>
+            <a:pPr algn="ctr"/>
+            <a:endParaRPr lang="en-US" dirty="0"/>
+          </a:p>
+        </p:txBody>
+      </p:sp>
+      <p:sp>
+        <p:nvSpPr>
+          <p:cNvPr id="11" name="TextBox 10">
+            <a:extLst>
+              <a:ext uri="{FF2B5EF4-FFF2-40B4-BE49-F238E27FC236}">
+                <a16:creationId xmlns:a16="http://schemas.microsoft.com/office/drawing/2014/main" id="{932DA44E-1C11-4ACE-9069-8E43A7C2B94C}"/>
+              </a:ext>
+            </a:extLst>
+          </p:cNvPr>
+          <p:cNvSpPr txBox="1"/>
+          <p:nvPr/>
+        </p:nvSpPr>
+        <p:spPr>
+          <a:xfrm>
+            <a:off x="3530294" y="1075438"/>
+            <a:ext cx="1152533" cy="369332"/>
+          </a:xfrm>
+          <a:prstGeom prst="rect">
+            <a:avLst/>
+          </a:prstGeom>
+          <a:noFill/>
+        </p:spPr>
+        <p:txBody>
+          <a:bodyPr wrap="square" rtlCol="0">
+            <a:spAutoFit/>
+          </a:bodyPr>
+          <a:lstStyle/>
+          <a:p>
+            <a:pPr algn="ctr"/>
+            <a:r>
+              <a:rPr lang="en-US" dirty="0"/>
+              <a:t>21</a:t>
+            </a:r>
+          </a:p>
+        </p:txBody>
+      </p:sp>
+    </p:spTree>
+    <p:extLst>
+      <p:ext uri="{BB962C8B-B14F-4D97-AF65-F5344CB8AC3E}">
+        <p14:creationId xmlns:p14="http://schemas.microsoft.com/office/powerpoint/2010/main" val="388467102"/>
       </p:ext>
     </p:extLst>
   </p:cSld>

</xml_diff>